<commit_message>
inicio da sesçção sore workflow e pull request
</commit_message>
<xml_diff>
--- a/TCC/versões/imagens/imagens.pptx
+++ b/TCC/versões/imagens/imagens.pptx
@@ -5,10 +5,13 @@
     <p:sldMasterId id="2147483660" r:id="rId1"/>
   </p:sldMasterIdLst>
   <p:notesMasterIdLst>
-    <p:notesMasterId r:id="rId3"/>
+    <p:notesMasterId r:id="rId6"/>
   </p:notesMasterIdLst>
   <p:sldIdLst>
     <p:sldId id="256" r:id="rId2"/>
+    <p:sldId id="257" r:id="rId3"/>
+    <p:sldId id="258" r:id="rId4"/>
+    <p:sldId id="259" r:id="rId5"/>
   </p:sldIdLst>
   <p:sldSz cx="12192000" cy="6858000"/>
   <p:notesSz cx="6858000" cy="9144000"/>
@@ -208,7 +211,7 @@
           <a:p>
             <a:fld id="{55688CA0-5F4B-48A2-9AC3-C8861425B993}" type="datetimeFigureOut">
               <a:rPr lang="pt-BR" smtClean="0"/>
-              <a:t>01/11/2019</a:t>
+              <a:t>04/11/2019</a:t>
             </a:fld>
             <a:endParaRPr lang="pt-BR"/>
           </a:p>
@@ -691,7 +694,7 @@
           <a:p>
             <a:fld id="{1EC0D891-8AD6-48DD-B95C-ECA6CD1B7C86}" type="datetimeFigureOut">
               <a:rPr lang="pt-BR" smtClean="0"/>
-              <a:t>01/11/2019</a:t>
+              <a:t>04/11/2019</a:t>
             </a:fld>
             <a:endParaRPr lang="pt-BR"/>
           </a:p>
@@ -861,7 +864,7 @@
           <a:p>
             <a:fld id="{1EC0D891-8AD6-48DD-B95C-ECA6CD1B7C86}" type="datetimeFigureOut">
               <a:rPr lang="pt-BR" smtClean="0"/>
-              <a:t>01/11/2019</a:t>
+              <a:t>04/11/2019</a:t>
             </a:fld>
             <a:endParaRPr lang="pt-BR"/>
           </a:p>
@@ -1041,7 +1044,7 @@
           <a:p>
             <a:fld id="{1EC0D891-8AD6-48DD-B95C-ECA6CD1B7C86}" type="datetimeFigureOut">
               <a:rPr lang="pt-BR" smtClean="0"/>
-              <a:t>01/11/2019</a:t>
+              <a:t>04/11/2019</a:t>
             </a:fld>
             <a:endParaRPr lang="pt-BR"/>
           </a:p>
@@ -1211,7 +1214,7 @@
           <a:p>
             <a:fld id="{1EC0D891-8AD6-48DD-B95C-ECA6CD1B7C86}" type="datetimeFigureOut">
               <a:rPr lang="pt-BR" smtClean="0"/>
-              <a:t>01/11/2019</a:t>
+              <a:t>04/11/2019</a:t>
             </a:fld>
             <a:endParaRPr lang="pt-BR"/>
           </a:p>
@@ -1457,7 +1460,7 @@
           <a:p>
             <a:fld id="{1EC0D891-8AD6-48DD-B95C-ECA6CD1B7C86}" type="datetimeFigureOut">
               <a:rPr lang="pt-BR" smtClean="0"/>
-              <a:t>01/11/2019</a:t>
+              <a:t>04/11/2019</a:t>
             </a:fld>
             <a:endParaRPr lang="pt-BR"/>
           </a:p>
@@ -1689,7 +1692,7 @@
           <a:p>
             <a:fld id="{1EC0D891-8AD6-48DD-B95C-ECA6CD1B7C86}" type="datetimeFigureOut">
               <a:rPr lang="pt-BR" smtClean="0"/>
-              <a:t>01/11/2019</a:t>
+              <a:t>04/11/2019</a:t>
             </a:fld>
             <a:endParaRPr lang="pt-BR"/>
           </a:p>
@@ -2056,7 +2059,7 @@
           <a:p>
             <a:fld id="{1EC0D891-8AD6-48DD-B95C-ECA6CD1B7C86}" type="datetimeFigureOut">
               <a:rPr lang="pt-BR" smtClean="0"/>
-              <a:t>01/11/2019</a:t>
+              <a:t>04/11/2019</a:t>
             </a:fld>
             <a:endParaRPr lang="pt-BR"/>
           </a:p>
@@ -2174,7 +2177,7 @@
           <a:p>
             <a:fld id="{1EC0D891-8AD6-48DD-B95C-ECA6CD1B7C86}" type="datetimeFigureOut">
               <a:rPr lang="pt-BR" smtClean="0"/>
-              <a:t>01/11/2019</a:t>
+              <a:t>04/11/2019</a:t>
             </a:fld>
             <a:endParaRPr lang="pt-BR"/>
           </a:p>
@@ -2269,7 +2272,7 @@
           <a:p>
             <a:fld id="{1EC0D891-8AD6-48DD-B95C-ECA6CD1B7C86}" type="datetimeFigureOut">
               <a:rPr lang="pt-BR" smtClean="0"/>
-              <a:t>01/11/2019</a:t>
+              <a:t>04/11/2019</a:t>
             </a:fld>
             <a:endParaRPr lang="pt-BR"/>
           </a:p>
@@ -2546,7 +2549,7 @@
           <a:p>
             <a:fld id="{1EC0D891-8AD6-48DD-B95C-ECA6CD1B7C86}" type="datetimeFigureOut">
               <a:rPr lang="pt-BR" smtClean="0"/>
-              <a:t>01/11/2019</a:t>
+              <a:t>04/11/2019</a:t>
             </a:fld>
             <a:endParaRPr lang="pt-BR"/>
           </a:p>
@@ -2803,7 +2806,7 @@
           <a:p>
             <a:fld id="{1EC0D891-8AD6-48DD-B95C-ECA6CD1B7C86}" type="datetimeFigureOut">
               <a:rPr lang="pt-BR" smtClean="0"/>
-              <a:t>01/11/2019</a:t>
+              <a:t>04/11/2019</a:t>
             </a:fld>
             <a:endParaRPr lang="pt-BR"/>
           </a:p>
@@ -3016,7 +3019,7 @@
           <a:p>
             <a:fld id="{1EC0D891-8AD6-48DD-B95C-ECA6CD1B7C86}" type="datetimeFigureOut">
               <a:rPr lang="pt-BR" smtClean="0"/>
-              <a:t>01/11/2019</a:t>
+              <a:t>04/11/2019</a:t>
             </a:fld>
             <a:endParaRPr lang="pt-BR"/>
           </a:p>
@@ -3421,29 +3424,941 @@
           <a:chExt cx="0" cy="0"/>
         </a:xfrm>
       </p:grpSpPr>
+      <p:grpSp>
+        <p:nvGrpSpPr>
+          <p:cNvPr id="2" name="Agrupar 1"/>
+          <p:cNvGrpSpPr/>
+          <p:nvPr/>
+        </p:nvGrpSpPr>
+        <p:grpSpPr>
+          <a:xfrm>
+            <a:off x="-557568" y="863220"/>
+            <a:ext cx="13715998" cy="2565781"/>
+            <a:chOff x="-557568" y="863220"/>
+            <a:chExt cx="13715998" cy="2565781"/>
+          </a:xfrm>
+        </p:grpSpPr>
+        <p:sp>
+          <p:nvSpPr>
+            <p:cNvPr id="6" name="Retângulo Arredondado 5"/>
+            <p:cNvSpPr/>
+            <p:nvPr/>
+          </p:nvSpPr>
+          <p:spPr>
+            <a:xfrm>
+              <a:off x="-557568" y="863222"/>
+              <a:ext cx="1965278" cy="2565779"/>
+            </a:xfrm>
+            <a:prstGeom prst="roundRect">
+              <a:avLst>
+                <a:gd name="adj" fmla="val 0"/>
+              </a:avLst>
+            </a:prstGeom>
+            <a:solidFill>
+              <a:srgbClr val="1D9A78"/>
+            </a:solidFill>
+            <a:ln>
+              <a:solidFill>
+                <a:schemeClr val="accent1">
+                  <a:lumMod val="50000"/>
+                </a:schemeClr>
+              </a:solidFill>
+            </a:ln>
+          </p:spPr>
+          <p:style>
+            <a:lnRef idx="2">
+              <a:schemeClr val="accent1">
+                <a:shade val="50000"/>
+              </a:schemeClr>
+            </a:lnRef>
+            <a:fillRef idx="1">
+              <a:schemeClr val="accent1"/>
+            </a:fillRef>
+            <a:effectRef idx="0">
+              <a:schemeClr val="accent1"/>
+            </a:effectRef>
+            <a:fontRef idx="minor">
+              <a:schemeClr val="lt1"/>
+            </a:fontRef>
+          </p:style>
+          <p:txBody>
+            <a:bodyPr rtlCol="0" anchor="ctr"/>
+            <a:lstStyle/>
+            <a:p>
+              <a:pPr algn="ctr"/>
+              <a:r>
+                <a:rPr lang="pt-BR" sz="2400" dirty="0" smtClean="0"/>
+                <a:t>Seleção dos dados que participaram do processo</a:t>
+              </a:r>
+              <a:endParaRPr lang="pt-BR" sz="2400" dirty="0"/>
+            </a:p>
+          </p:txBody>
+        </p:sp>
+        <p:sp>
+          <p:nvSpPr>
+            <p:cNvPr id="7" name="Retângulo Arredondado 6"/>
+            <p:cNvSpPr/>
+            <p:nvPr/>
+          </p:nvSpPr>
+          <p:spPr>
+            <a:xfrm>
+              <a:off x="2024133" y="863221"/>
+              <a:ext cx="2536210" cy="2565779"/>
+            </a:xfrm>
+            <a:prstGeom prst="roundRect">
+              <a:avLst>
+                <a:gd name="adj" fmla="val 0"/>
+              </a:avLst>
+            </a:prstGeom>
+            <a:solidFill>
+              <a:srgbClr val="1D9A78"/>
+            </a:solidFill>
+            <a:ln>
+              <a:solidFill>
+                <a:schemeClr val="accent1">
+                  <a:lumMod val="50000"/>
+                </a:schemeClr>
+              </a:solidFill>
+            </a:ln>
+          </p:spPr>
+          <p:style>
+            <a:lnRef idx="2">
+              <a:schemeClr val="accent1">
+                <a:shade val="50000"/>
+              </a:schemeClr>
+            </a:lnRef>
+            <a:fillRef idx="1">
+              <a:schemeClr val="accent1"/>
+            </a:fillRef>
+            <a:effectRef idx="0">
+              <a:schemeClr val="accent1"/>
+            </a:effectRef>
+            <a:fontRef idx="minor">
+              <a:schemeClr val="lt1"/>
+            </a:fontRef>
+          </p:style>
+          <p:txBody>
+            <a:bodyPr rtlCol="0" anchor="ctr"/>
+            <a:lstStyle/>
+            <a:p>
+              <a:pPr algn="ctr"/>
+              <a:r>
+                <a:rPr lang="pt-BR" sz="2400" dirty="0" smtClean="0"/>
+                <a:t>Pré-processamento dos dados</a:t>
+              </a:r>
+              <a:endParaRPr lang="pt-BR" sz="2400" dirty="0"/>
+            </a:p>
+          </p:txBody>
+        </p:sp>
+        <p:sp>
+          <p:nvSpPr>
+            <p:cNvPr id="8" name="Retângulo Arredondado 7"/>
+            <p:cNvSpPr/>
+            <p:nvPr/>
+          </p:nvSpPr>
+          <p:spPr>
+            <a:xfrm>
+              <a:off x="5176766" y="863221"/>
+              <a:ext cx="2249606" cy="2565779"/>
+            </a:xfrm>
+            <a:prstGeom prst="roundRect">
+              <a:avLst>
+                <a:gd name="adj" fmla="val 0"/>
+              </a:avLst>
+            </a:prstGeom>
+            <a:solidFill>
+              <a:srgbClr val="1D9A78"/>
+            </a:solidFill>
+            <a:ln>
+              <a:solidFill>
+                <a:schemeClr val="accent1">
+                  <a:lumMod val="50000"/>
+                </a:schemeClr>
+              </a:solidFill>
+            </a:ln>
+          </p:spPr>
+          <p:style>
+            <a:lnRef idx="2">
+              <a:schemeClr val="accent1">
+                <a:shade val="50000"/>
+              </a:schemeClr>
+            </a:lnRef>
+            <a:fillRef idx="1">
+              <a:schemeClr val="accent1"/>
+            </a:fillRef>
+            <a:effectRef idx="0">
+              <a:schemeClr val="accent1"/>
+            </a:effectRef>
+            <a:fontRef idx="minor">
+              <a:schemeClr val="lt1"/>
+            </a:fontRef>
+          </p:style>
+          <p:txBody>
+            <a:bodyPr rtlCol="0" anchor="ctr"/>
+            <a:lstStyle/>
+            <a:p>
+              <a:pPr algn="ctr"/>
+              <a:r>
+                <a:rPr lang="pt-BR" sz="2400" dirty="0" smtClean="0"/>
+                <a:t>Transformação dos dados</a:t>
+              </a:r>
+              <a:endParaRPr lang="pt-BR" sz="2400" dirty="0"/>
+            </a:p>
+          </p:txBody>
+        </p:sp>
+        <p:sp>
+          <p:nvSpPr>
+            <p:cNvPr id="9" name="Retângulo Arredondado 8"/>
+            <p:cNvSpPr/>
+            <p:nvPr/>
+          </p:nvSpPr>
+          <p:spPr>
+            <a:xfrm>
+              <a:off x="8042795" y="863221"/>
+              <a:ext cx="2249606" cy="2565779"/>
+            </a:xfrm>
+            <a:prstGeom prst="roundRect">
+              <a:avLst>
+                <a:gd name="adj" fmla="val 0"/>
+              </a:avLst>
+            </a:prstGeom>
+            <a:solidFill>
+              <a:srgbClr val="1D9A78"/>
+            </a:solidFill>
+            <a:ln>
+              <a:solidFill>
+                <a:schemeClr val="accent1">
+                  <a:lumMod val="50000"/>
+                </a:schemeClr>
+              </a:solidFill>
+            </a:ln>
+          </p:spPr>
+          <p:style>
+            <a:lnRef idx="2">
+              <a:schemeClr val="accent1">
+                <a:shade val="50000"/>
+              </a:schemeClr>
+            </a:lnRef>
+            <a:fillRef idx="1">
+              <a:schemeClr val="accent1"/>
+            </a:fillRef>
+            <a:effectRef idx="0">
+              <a:schemeClr val="accent1"/>
+            </a:effectRef>
+            <a:fontRef idx="minor">
+              <a:schemeClr val="lt1"/>
+            </a:fontRef>
+          </p:style>
+          <p:txBody>
+            <a:bodyPr rtlCol="0" anchor="ctr"/>
+            <a:lstStyle/>
+            <a:p>
+              <a:pPr algn="ctr"/>
+              <a:r>
+                <a:rPr lang="pt-BR" sz="2400" dirty="0" smtClean="0"/>
+                <a:t>Mineração dos dados</a:t>
+              </a:r>
+              <a:endParaRPr lang="pt-BR" sz="2400" dirty="0"/>
+            </a:p>
+          </p:txBody>
+        </p:sp>
+        <p:sp>
+          <p:nvSpPr>
+            <p:cNvPr id="10" name="Retângulo Arredondado 9"/>
+            <p:cNvSpPr/>
+            <p:nvPr/>
+          </p:nvSpPr>
+          <p:spPr>
+            <a:xfrm>
+              <a:off x="10908824" y="863220"/>
+              <a:ext cx="2249606" cy="2565779"/>
+            </a:xfrm>
+            <a:prstGeom prst="roundRect">
+              <a:avLst>
+                <a:gd name="adj" fmla="val 0"/>
+              </a:avLst>
+            </a:prstGeom>
+            <a:solidFill>
+              <a:srgbClr val="1D9A78"/>
+            </a:solidFill>
+            <a:ln>
+              <a:solidFill>
+                <a:schemeClr val="accent1">
+                  <a:lumMod val="50000"/>
+                </a:schemeClr>
+              </a:solidFill>
+            </a:ln>
+          </p:spPr>
+          <p:style>
+            <a:lnRef idx="2">
+              <a:schemeClr val="accent1">
+                <a:shade val="50000"/>
+              </a:schemeClr>
+            </a:lnRef>
+            <a:fillRef idx="1">
+              <a:schemeClr val="accent1"/>
+            </a:fillRef>
+            <a:effectRef idx="0">
+              <a:schemeClr val="accent1"/>
+            </a:effectRef>
+            <a:fontRef idx="minor">
+              <a:schemeClr val="lt1"/>
+            </a:fontRef>
+          </p:style>
+          <p:txBody>
+            <a:bodyPr rtlCol="0" anchor="ctr"/>
+            <a:lstStyle/>
+            <a:p>
+              <a:pPr algn="ctr"/>
+              <a:r>
+                <a:rPr lang="pt-BR" sz="2400" dirty="0" smtClean="0"/>
+                <a:t>Interpretação e avaliação dos resultados</a:t>
+              </a:r>
+              <a:endParaRPr lang="pt-BR" sz="2400" dirty="0"/>
+            </a:p>
+          </p:txBody>
+        </p:sp>
+        <p:sp>
+          <p:nvSpPr>
+            <p:cNvPr id="12" name="Seta para a Direita 11"/>
+            <p:cNvSpPr/>
+            <p:nvPr/>
+          </p:nvSpPr>
+          <p:spPr>
+            <a:xfrm>
+              <a:off x="1407710" y="1795865"/>
+              <a:ext cx="616423" cy="700488"/>
+            </a:xfrm>
+            <a:prstGeom prst="rightArrow">
+              <a:avLst>
+                <a:gd name="adj1" fmla="val 50000"/>
+                <a:gd name="adj2" fmla="val 65834"/>
+              </a:avLst>
+            </a:prstGeom>
+            <a:solidFill>
+              <a:schemeClr val="accent2"/>
+            </a:solidFill>
+            <a:ln>
+              <a:solidFill>
+                <a:schemeClr val="accent2">
+                  <a:lumMod val="50000"/>
+                </a:schemeClr>
+              </a:solidFill>
+            </a:ln>
+          </p:spPr>
+          <p:style>
+            <a:lnRef idx="2">
+              <a:schemeClr val="accent1">
+                <a:shade val="50000"/>
+              </a:schemeClr>
+            </a:lnRef>
+            <a:fillRef idx="1">
+              <a:schemeClr val="accent1"/>
+            </a:fillRef>
+            <a:effectRef idx="0">
+              <a:schemeClr val="accent1"/>
+            </a:effectRef>
+            <a:fontRef idx="minor">
+              <a:schemeClr val="lt1"/>
+            </a:fontRef>
+          </p:style>
+          <p:txBody>
+            <a:bodyPr rtlCol="0" anchor="ctr"/>
+            <a:lstStyle/>
+            <a:p>
+              <a:pPr algn="ctr"/>
+              <a:endParaRPr lang="pt-BR"/>
+            </a:p>
+          </p:txBody>
+        </p:sp>
+        <p:sp>
+          <p:nvSpPr>
+            <p:cNvPr id="13" name="Seta para a Direita 12"/>
+            <p:cNvSpPr/>
+            <p:nvPr/>
+          </p:nvSpPr>
+          <p:spPr>
+            <a:xfrm>
+              <a:off x="4561086" y="1795865"/>
+              <a:ext cx="616423" cy="700488"/>
+            </a:xfrm>
+            <a:prstGeom prst="rightArrow">
+              <a:avLst>
+                <a:gd name="adj1" fmla="val 50000"/>
+                <a:gd name="adj2" fmla="val 65834"/>
+              </a:avLst>
+            </a:prstGeom>
+            <a:solidFill>
+              <a:schemeClr val="accent2"/>
+            </a:solidFill>
+            <a:ln>
+              <a:solidFill>
+                <a:schemeClr val="accent2">
+                  <a:lumMod val="50000"/>
+                </a:schemeClr>
+              </a:solidFill>
+            </a:ln>
+          </p:spPr>
+          <p:style>
+            <a:lnRef idx="2">
+              <a:schemeClr val="accent1">
+                <a:shade val="50000"/>
+              </a:schemeClr>
+            </a:lnRef>
+            <a:fillRef idx="1">
+              <a:schemeClr val="accent1"/>
+            </a:fillRef>
+            <a:effectRef idx="0">
+              <a:schemeClr val="accent1"/>
+            </a:effectRef>
+            <a:fontRef idx="minor">
+              <a:schemeClr val="lt1"/>
+            </a:fontRef>
+          </p:style>
+          <p:txBody>
+            <a:bodyPr rtlCol="0" anchor="ctr"/>
+            <a:lstStyle/>
+            <a:p>
+              <a:pPr algn="ctr"/>
+              <a:endParaRPr lang="pt-BR"/>
+            </a:p>
+          </p:txBody>
+        </p:sp>
+        <p:sp>
+          <p:nvSpPr>
+            <p:cNvPr id="14" name="Seta para a Direita 13"/>
+            <p:cNvSpPr/>
+            <p:nvPr/>
+          </p:nvSpPr>
+          <p:spPr>
+            <a:xfrm>
+              <a:off x="7428929" y="1795865"/>
+              <a:ext cx="616423" cy="700488"/>
+            </a:xfrm>
+            <a:prstGeom prst="rightArrow">
+              <a:avLst>
+                <a:gd name="adj1" fmla="val 50000"/>
+                <a:gd name="adj2" fmla="val 65834"/>
+              </a:avLst>
+            </a:prstGeom>
+            <a:solidFill>
+              <a:schemeClr val="accent2"/>
+            </a:solidFill>
+            <a:ln>
+              <a:solidFill>
+                <a:schemeClr val="accent2">
+                  <a:lumMod val="50000"/>
+                </a:schemeClr>
+              </a:solidFill>
+            </a:ln>
+          </p:spPr>
+          <p:style>
+            <a:lnRef idx="2">
+              <a:schemeClr val="accent1">
+                <a:shade val="50000"/>
+              </a:schemeClr>
+            </a:lnRef>
+            <a:fillRef idx="1">
+              <a:schemeClr val="accent1"/>
+            </a:fillRef>
+            <a:effectRef idx="0">
+              <a:schemeClr val="accent1"/>
+            </a:effectRef>
+            <a:fontRef idx="minor">
+              <a:schemeClr val="lt1"/>
+            </a:fontRef>
+          </p:style>
+          <p:txBody>
+            <a:bodyPr rtlCol="0" anchor="ctr"/>
+            <a:lstStyle/>
+            <a:p>
+              <a:pPr algn="ctr"/>
+              <a:endParaRPr lang="pt-BR"/>
+            </a:p>
+          </p:txBody>
+        </p:sp>
+        <p:sp>
+          <p:nvSpPr>
+            <p:cNvPr id="15" name="Seta para a Direita 14"/>
+            <p:cNvSpPr/>
+            <p:nvPr/>
+          </p:nvSpPr>
+          <p:spPr>
+            <a:xfrm>
+              <a:off x="10289938" y="1795865"/>
+              <a:ext cx="616423" cy="700488"/>
+            </a:xfrm>
+            <a:prstGeom prst="rightArrow">
+              <a:avLst>
+                <a:gd name="adj1" fmla="val 50000"/>
+                <a:gd name="adj2" fmla="val 65834"/>
+              </a:avLst>
+            </a:prstGeom>
+            <a:solidFill>
+              <a:schemeClr val="accent2"/>
+            </a:solidFill>
+            <a:ln>
+              <a:solidFill>
+                <a:schemeClr val="accent2">
+                  <a:lumMod val="50000"/>
+                </a:schemeClr>
+              </a:solidFill>
+            </a:ln>
+          </p:spPr>
+          <p:style>
+            <a:lnRef idx="2">
+              <a:schemeClr val="accent1">
+                <a:shade val="50000"/>
+              </a:schemeClr>
+            </a:lnRef>
+            <a:fillRef idx="1">
+              <a:schemeClr val="accent1"/>
+            </a:fillRef>
+            <a:effectRef idx="0">
+              <a:schemeClr val="accent1"/>
+            </a:effectRef>
+            <a:fontRef idx="minor">
+              <a:schemeClr val="lt1"/>
+            </a:fontRef>
+          </p:style>
+          <p:txBody>
+            <a:bodyPr rtlCol="0" anchor="ctr"/>
+            <a:lstStyle/>
+            <a:p>
+              <a:pPr algn="ctr"/>
+              <a:endParaRPr lang="pt-BR"/>
+            </a:p>
+          </p:txBody>
+        </p:sp>
+      </p:grpSp>
+    </p:spTree>
+    <p:extLst>
+      <p:ext uri="{BB962C8B-B14F-4D97-AF65-F5344CB8AC3E}">
+        <p14:creationId xmlns:p14="http://schemas.microsoft.com/office/powerpoint/2010/main" val="296841696"/>
+      </p:ext>
+    </p:extLst>
+  </p:cSld>
+  <p:clrMapOvr>
+    <a:masterClrMapping/>
+  </p:clrMapOvr>
+</p:sld>
+</file>
+
+<file path=ppt/slides/slide2.xml><?xml version="1.0" encoding="utf-8"?>
+<p:sld xmlns:a="http://schemas.openxmlformats.org/drawingml/2006/main" xmlns:r="http://schemas.openxmlformats.org/officeDocument/2006/relationships" xmlns:p="http://schemas.openxmlformats.org/presentationml/2006/main">
+  <p:cSld>
+    <p:spTree>
+      <p:nvGrpSpPr>
+        <p:cNvPr id="1" name=""/>
+        <p:cNvGrpSpPr/>
+        <p:nvPr/>
+      </p:nvGrpSpPr>
+      <p:grpSpPr>
+        <a:xfrm>
+          <a:off x="0" y="0"/>
+          <a:ext cx="0" cy="0"/>
+          <a:chOff x="0" y="0"/>
+          <a:chExt cx="0" cy="0"/>
+        </a:xfrm>
+      </p:grpSpPr>
       <p:sp>
         <p:nvSpPr>
-          <p:cNvPr id="6" name="Retângulo Arredondado 5"/>
+          <p:cNvPr id="90" name="Cilindro 89"/>
           <p:cNvSpPr/>
           <p:nvPr/>
         </p:nvSpPr>
         <p:spPr>
           <a:xfrm>
-            <a:off x="1023582" y="1214651"/>
-            <a:ext cx="1965278" cy="2565779"/>
+            <a:off x="4433887" y="3429000"/>
+            <a:ext cx="3324225" cy="1618801"/>
           </a:xfrm>
-          <a:prstGeom prst="roundRect">
+          <a:prstGeom prst="can">
+            <a:avLst>
+              <a:gd name="adj" fmla="val 50000"/>
+            </a:avLst>
+          </a:prstGeom>
+          <a:ln w="57150"/>
+        </p:spPr>
+        <p:style>
+          <a:lnRef idx="2">
+            <a:schemeClr val="accent4">
+              <a:shade val="50000"/>
+            </a:schemeClr>
+          </a:lnRef>
+          <a:fillRef idx="1">
+            <a:schemeClr val="accent4"/>
+          </a:fillRef>
+          <a:effectRef idx="0">
+            <a:schemeClr val="accent4"/>
+          </a:effectRef>
+          <a:fontRef idx="minor">
+            <a:schemeClr val="lt1"/>
+          </a:fontRef>
+        </p:style>
+        <p:txBody>
+          <a:bodyPr rtlCol="0" anchor="ctr"/>
+          <a:lstStyle/>
+          <a:p>
+            <a:pPr algn="ctr"/>
+            <a:endParaRPr lang="pt-BR"/>
+          </a:p>
+        </p:txBody>
+      </p:sp>
+      <p:grpSp>
+        <p:nvGrpSpPr>
+          <p:cNvPr id="99" name="Agrupar 98"/>
+          <p:cNvGrpSpPr/>
+          <p:nvPr/>
+        </p:nvGrpSpPr>
+        <p:grpSpPr>
+          <a:xfrm>
+            <a:off x="1595252" y="2375817"/>
+            <a:ext cx="1260000" cy="1835077"/>
+            <a:chOff x="2331379" y="2184473"/>
+            <a:chExt cx="1260000" cy="1835077"/>
+          </a:xfrm>
+        </p:grpSpPr>
+        <p:sp>
+          <p:nvSpPr>
+            <p:cNvPr id="91" name="Corda 90"/>
+            <p:cNvSpPr/>
+            <p:nvPr/>
+          </p:nvSpPr>
+          <p:spPr>
+            <a:xfrm rot="10800000" flipV="1">
+              <a:off x="2331379" y="2759550"/>
+              <a:ext cx="1260000" cy="1260000"/>
+            </a:xfrm>
+            <a:prstGeom prst="chord">
+              <a:avLst>
+                <a:gd name="adj1" fmla="val 10330544"/>
+                <a:gd name="adj2" fmla="val 472351"/>
+              </a:avLst>
+            </a:prstGeom>
+            <a:ln w="57150"/>
+          </p:spPr>
+          <p:style>
+            <a:lnRef idx="2">
+              <a:schemeClr val="accent1">
+                <a:shade val="50000"/>
+              </a:schemeClr>
+            </a:lnRef>
+            <a:fillRef idx="1">
+              <a:schemeClr val="accent1"/>
+            </a:fillRef>
+            <a:effectRef idx="0">
+              <a:schemeClr val="accent1"/>
+            </a:effectRef>
+            <a:fontRef idx="minor">
+              <a:schemeClr val="lt1"/>
+            </a:fontRef>
+          </p:style>
+          <p:txBody>
+            <a:bodyPr rtlCol="0" anchor="ctr"/>
+            <a:lstStyle/>
+            <a:p>
+              <a:pPr algn="ctr"/>
+              <a:endParaRPr lang="pt-BR"/>
+            </a:p>
+          </p:txBody>
+        </p:sp>
+        <p:sp>
+          <p:nvSpPr>
+            <p:cNvPr id="92" name="Elipse 91"/>
+            <p:cNvSpPr/>
+            <p:nvPr/>
+          </p:nvSpPr>
+          <p:spPr>
+            <a:xfrm>
+              <a:off x="2601378" y="2184473"/>
+              <a:ext cx="720000" cy="720000"/>
+            </a:xfrm>
+            <a:prstGeom prst="ellipse">
+              <a:avLst/>
+            </a:prstGeom>
+            <a:ln w="57150"/>
+          </p:spPr>
+          <p:style>
+            <a:lnRef idx="2">
+              <a:schemeClr val="accent1">
+                <a:shade val="50000"/>
+              </a:schemeClr>
+            </a:lnRef>
+            <a:fillRef idx="1">
+              <a:schemeClr val="accent1"/>
+            </a:fillRef>
+            <a:effectRef idx="0">
+              <a:schemeClr val="accent1"/>
+            </a:effectRef>
+            <a:fontRef idx="minor">
+              <a:schemeClr val="lt1"/>
+            </a:fontRef>
+          </p:style>
+          <p:txBody>
+            <a:bodyPr rtlCol="0" anchor="ctr"/>
+            <a:lstStyle/>
+            <a:p>
+              <a:pPr algn="ctr"/>
+              <a:endParaRPr lang="pt-BR"/>
+            </a:p>
+          </p:txBody>
+        </p:sp>
+      </p:grpSp>
+      <p:grpSp>
+        <p:nvGrpSpPr>
+          <p:cNvPr id="97" name="Agrupar 96"/>
+          <p:cNvGrpSpPr/>
+          <p:nvPr/>
+        </p:nvGrpSpPr>
+        <p:grpSpPr>
+          <a:xfrm>
+            <a:off x="5465999" y="1115817"/>
+            <a:ext cx="1260000" cy="1835077"/>
+            <a:chOff x="5176179" y="1018596"/>
+            <a:chExt cx="1260000" cy="1835077"/>
+          </a:xfrm>
+        </p:grpSpPr>
+        <p:sp>
+          <p:nvSpPr>
+            <p:cNvPr id="93" name="Corda 92"/>
+            <p:cNvSpPr/>
+            <p:nvPr/>
+          </p:nvSpPr>
+          <p:spPr>
+            <a:xfrm rot="10800000" flipV="1">
+              <a:off x="5176179" y="1593673"/>
+              <a:ext cx="1260000" cy="1260000"/>
+            </a:xfrm>
+            <a:prstGeom prst="chord">
+              <a:avLst>
+                <a:gd name="adj1" fmla="val 10330544"/>
+                <a:gd name="adj2" fmla="val 472351"/>
+              </a:avLst>
+            </a:prstGeom>
+            <a:ln w="57150"/>
+          </p:spPr>
+          <p:style>
+            <a:lnRef idx="2">
+              <a:schemeClr val="accent1">
+                <a:shade val="50000"/>
+              </a:schemeClr>
+            </a:lnRef>
+            <a:fillRef idx="1">
+              <a:schemeClr val="accent1"/>
+            </a:fillRef>
+            <a:effectRef idx="0">
+              <a:schemeClr val="accent1"/>
+            </a:effectRef>
+            <a:fontRef idx="minor">
+              <a:schemeClr val="lt1"/>
+            </a:fontRef>
+          </p:style>
+          <p:txBody>
+            <a:bodyPr rtlCol="0" anchor="ctr"/>
+            <a:lstStyle/>
+            <a:p>
+              <a:pPr algn="ctr"/>
+              <a:endParaRPr lang="pt-BR"/>
+            </a:p>
+          </p:txBody>
+        </p:sp>
+        <p:sp>
+          <p:nvSpPr>
+            <p:cNvPr id="94" name="Elipse 93"/>
+            <p:cNvSpPr/>
+            <p:nvPr/>
+          </p:nvSpPr>
+          <p:spPr>
+            <a:xfrm>
+              <a:off x="5446178" y="1018596"/>
+              <a:ext cx="720000" cy="720000"/>
+            </a:xfrm>
+            <a:prstGeom prst="ellipse">
+              <a:avLst/>
+            </a:prstGeom>
+            <a:ln w="57150"/>
+          </p:spPr>
+          <p:style>
+            <a:lnRef idx="2">
+              <a:schemeClr val="accent1">
+                <a:shade val="50000"/>
+              </a:schemeClr>
+            </a:lnRef>
+            <a:fillRef idx="1">
+              <a:schemeClr val="accent1"/>
+            </a:fillRef>
+            <a:effectRef idx="0">
+              <a:schemeClr val="accent1"/>
+            </a:effectRef>
+            <a:fontRef idx="minor">
+              <a:schemeClr val="lt1"/>
+            </a:fontRef>
+          </p:style>
+          <p:txBody>
+            <a:bodyPr rtlCol="0" anchor="ctr"/>
+            <a:lstStyle/>
+            <a:p>
+              <a:pPr algn="ctr"/>
+              <a:endParaRPr lang="pt-BR"/>
+            </a:p>
+          </p:txBody>
+        </p:sp>
+      </p:grpSp>
+      <p:grpSp>
+        <p:nvGrpSpPr>
+          <p:cNvPr id="98" name="Agrupar 97"/>
+          <p:cNvGrpSpPr/>
+          <p:nvPr/>
+        </p:nvGrpSpPr>
+        <p:grpSpPr>
+          <a:xfrm>
+            <a:off x="9336746" y="2375817"/>
+            <a:ext cx="1260000" cy="1835077"/>
+            <a:chOff x="8357346" y="2278596"/>
+            <a:chExt cx="1260000" cy="1835077"/>
+          </a:xfrm>
+        </p:grpSpPr>
+        <p:sp>
+          <p:nvSpPr>
+            <p:cNvPr id="95" name="Corda 94"/>
+            <p:cNvSpPr/>
+            <p:nvPr/>
+          </p:nvSpPr>
+          <p:spPr>
+            <a:xfrm rot="10800000" flipV="1">
+              <a:off x="8357346" y="2853673"/>
+              <a:ext cx="1260000" cy="1260000"/>
+            </a:xfrm>
+            <a:prstGeom prst="chord">
+              <a:avLst>
+                <a:gd name="adj1" fmla="val 10330544"/>
+                <a:gd name="adj2" fmla="val 472351"/>
+              </a:avLst>
+            </a:prstGeom>
+            <a:ln w="57150"/>
+          </p:spPr>
+          <p:style>
+            <a:lnRef idx="2">
+              <a:schemeClr val="accent1">
+                <a:shade val="50000"/>
+              </a:schemeClr>
+            </a:lnRef>
+            <a:fillRef idx="1">
+              <a:schemeClr val="accent1"/>
+            </a:fillRef>
+            <a:effectRef idx="0">
+              <a:schemeClr val="accent1"/>
+            </a:effectRef>
+            <a:fontRef idx="minor">
+              <a:schemeClr val="lt1"/>
+            </a:fontRef>
+          </p:style>
+          <p:txBody>
+            <a:bodyPr rtlCol="0" anchor="ctr"/>
+            <a:lstStyle/>
+            <a:p>
+              <a:pPr algn="ctr"/>
+              <a:endParaRPr lang="pt-BR"/>
+            </a:p>
+          </p:txBody>
+        </p:sp>
+        <p:sp>
+          <p:nvSpPr>
+            <p:cNvPr id="96" name="Elipse 95"/>
+            <p:cNvSpPr/>
+            <p:nvPr/>
+          </p:nvSpPr>
+          <p:spPr>
+            <a:xfrm>
+              <a:off x="8627345" y="2278596"/>
+              <a:ext cx="720000" cy="720000"/>
+            </a:xfrm>
+            <a:prstGeom prst="ellipse">
+              <a:avLst/>
+            </a:prstGeom>
+            <a:ln w="57150"/>
+          </p:spPr>
+          <p:style>
+            <a:lnRef idx="2">
+              <a:schemeClr val="accent1">
+                <a:shade val="50000"/>
+              </a:schemeClr>
+            </a:lnRef>
+            <a:fillRef idx="1">
+              <a:schemeClr val="accent1"/>
+            </a:fillRef>
+            <a:effectRef idx="0">
+              <a:schemeClr val="accent1"/>
+            </a:effectRef>
+            <a:fontRef idx="minor">
+              <a:schemeClr val="lt1"/>
+            </a:fontRef>
+          </p:style>
+          <p:txBody>
+            <a:bodyPr rtlCol="0" anchor="ctr"/>
+            <a:lstStyle/>
+            <a:p>
+              <a:pPr algn="ctr"/>
+              <a:endParaRPr lang="pt-BR"/>
+            </a:p>
+          </p:txBody>
+        </p:sp>
+      </p:grpSp>
+      <p:cxnSp>
+        <p:nvCxnSpPr>
+          <p:cNvPr id="107" name="Conector de Seta Reta 106"/>
+          <p:cNvCxnSpPr/>
+          <p:nvPr/>
+        </p:nvCxnSpPr>
+        <p:spPr>
+          <a:xfrm>
+            <a:off x="6096000" y="2540000"/>
+            <a:ext cx="10436" cy="753356"/>
+          </a:xfrm>
+          <a:prstGeom prst="straightConnector1">
+            <a:avLst/>
+          </a:prstGeom>
+          <a:ln w="76200">
+            <a:headEnd type="triangle"/>
+            <a:tailEnd type="triangle"/>
+          </a:ln>
+        </p:spPr>
+        <p:style>
+          <a:lnRef idx="1">
+            <a:schemeClr val="accent1"/>
+          </a:lnRef>
+          <a:fillRef idx="0">
+            <a:schemeClr val="accent1"/>
+          </a:fillRef>
+          <a:effectRef idx="0">
+            <a:schemeClr val="accent1"/>
+          </a:effectRef>
+          <a:fontRef idx="minor">
+            <a:schemeClr val="tx1"/>
+          </a:fontRef>
+        </p:style>
+      </p:cxnSp>
+      <p:sp>
+        <p:nvSpPr>
+          <p:cNvPr id="115" name="Retângulo 114"/>
+          <p:cNvSpPr/>
+          <p:nvPr/>
+        </p:nvSpPr>
+        <p:spPr>
+          <a:xfrm>
+            <a:off x="8741280" y="1690893"/>
+            <a:ext cx="2450930" cy="528744"/>
+          </a:xfrm>
+          <a:prstGeom prst="rect">
             <a:avLst/>
           </a:prstGeom>
           <a:solidFill>
-            <a:srgbClr val="1D9A78"/>
+            <a:schemeClr val="bg2">
+              <a:lumMod val="90000"/>
+            </a:schemeClr>
           </a:solidFill>
           <a:ln>
-            <a:solidFill>
-              <a:schemeClr val="accent1">
-                <a:lumMod val="50000"/>
-              </a:schemeClr>
-            </a:solidFill>
+            <a:noFill/>
           </a:ln>
         </p:spPr>
         <p:style>
@@ -3468,36 +4383,50 @@
           <a:p>
             <a:pPr algn="ctr"/>
             <a:r>
-              <a:rPr lang="pt-BR" sz="2400" dirty="0" smtClean="0"/>
-              <a:t>Seleção dos dados que participaram do processo</a:t>
+              <a:rPr lang="pt-BR" sz="2400" dirty="0" smtClean="0">
+                <a:solidFill>
+                  <a:schemeClr val="bg2">
+                    <a:lumMod val="10000"/>
+                  </a:schemeClr>
+                </a:solidFill>
+                <a:latin typeface="Arial" panose="020B0604020202020204" pitchFamily="34" charset="0"/>
+                <a:cs typeface="Arial" panose="020B0604020202020204" pitchFamily="34" charset="0"/>
+              </a:rPr>
+              <a:t>Desenvolvedor</a:t>
             </a:r>
-            <a:endParaRPr lang="pt-BR" sz="2400" dirty="0"/>
+            <a:endParaRPr lang="pt-BR" sz="2400" dirty="0">
+              <a:solidFill>
+                <a:schemeClr val="bg2">
+                  <a:lumMod val="10000"/>
+                </a:schemeClr>
+              </a:solidFill>
+              <a:latin typeface="Arial" panose="020B0604020202020204" pitchFamily="34" charset="0"/>
+              <a:cs typeface="Arial" panose="020B0604020202020204" pitchFamily="34" charset="0"/>
+            </a:endParaRPr>
           </a:p>
         </p:txBody>
       </p:sp>
       <p:sp>
         <p:nvSpPr>
-          <p:cNvPr id="7" name="Retângulo Arredondado 6"/>
+          <p:cNvPr id="118" name="Retângulo 117"/>
           <p:cNvSpPr/>
           <p:nvPr/>
         </p:nvSpPr>
         <p:spPr>
           <a:xfrm>
-            <a:off x="3605283" y="1214650"/>
-            <a:ext cx="2536210" cy="2565779"/>
+            <a:off x="4125912" y="5250039"/>
+            <a:ext cx="3940176" cy="551735"/>
           </a:xfrm>
-          <a:prstGeom prst="roundRect">
+          <a:prstGeom prst="rect">
             <a:avLst/>
           </a:prstGeom>
           <a:solidFill>
-            <a:srgbClr val="1D9A78"/>
+            <a:schemeClr val="bg2">
+              <a:lumMod val="90000"/>
+            </a:schemeClr>
           </a:solidFill>
           <a:ln>
-            <a:solidFill>
-              <a:schemeClr val="accent1">
-                <a:lumMod val="50000"/>
-              </a:schemeClr>
-            </a:solidFill>
+            <a:noFill/>
           </a:ln>
         </p:spPr>
         <p:style>
@@ -3522,36 +4451,118 @@
           <a:p>
             <a:pPr algn="ctr"/>
             <a:r>
-              <a:rPr lang="pt-BR" sz="2400" dirty="0" smtClean="0"/>
-              <a:t>Pré-processamento dos dados</a:t>
+              <a:rPr lang="pt-BR" sz="2400" dirty="0" smtClean="0">
+                <a:solidFill>
+                  <a:schemeClr val="bg2">
+                    <a:lumMod val="10000"/>
+                  </a:schemeClr>
+                </a:solidFill>
+                <a:latin typeface="Arial" panose="020B0604020202020204" pitchFamily="34" charset="0"/>
+                <a:cs typeface="Arial" panose="020B0604020202020204" pitchFamily="34" charset="0"/>
+              </a:rPr>
+              <a:t>Repositório compartilhado</a:t>
             </a:r>
-            <a:endParaRPr lang="pt-BR" sz="2400" dirty="0"/>
+            <a:endParaRPr lang="pt-BR" sz="2400" dirty="0">
+              <a:solidFill>
+                <a:schemeClr val="bg2">
+                  <a:lumMod val="10000"/>
+                </a:schemeClr>
+              </a:solidFill>
+              <a:latin typeface="Arial" panose="020B0604020202020204" pitchFamily="34" charset="0"/>
+              <a:cs typeface="Arial" panose="020B0604020202020204" pitchFamily="34" charset="0"/>
+            </a:endParaRPr>
           </a:p>
         </p:txBody>
       </p:sp>
+      <p:cxnSp>
+        <p:nvCxnSpPr>
+          <p:cNvPr id="122" name="Conector de Seta Reta 121"/>
+          <p:cNvCxnSpPr/>
+          <p:nvPr/>
+        </p:nvCxnSpPr>
+        <p:spPr>
+          <a:xfrm>
+            <a:off x="2985034" y="3429000"/>
+            <a:ext cx="1325709" cy="342462"/>
+          </a:xfrm>
+          <a:prstGeom prst="straightConnector1">
+            <a:avLst/>
+          </a:prstGeom>
+          <a:ln w="76200">
+            <a:headEnd type="triangle"/>
+            <a:tailEnd type="triangle"/>
+          </a:ln>
+        </p:spPr>
+        <p:style>
+          <a:lnRef idx="1">
+            <a:schemeClr val="accent1"/>
+          </a:lnRef>
+          <a:fillRef idx="0">
+            <a:schemeClr val="accent1"/>
+          </a:fillRef>
+          <a:effectRef idx="0">
+            <a:schemeClr val="accent1"/>
+          </a:effectRef>
+          <a:fontRef idx="minor">
+            <a:schemeClr val="tx1"/>
+          </a:fontRef>
+        </p:style>
+      </p:cxnSp>
+      <p:cxnSp>
+        <p:nvCxnSpPr>
+          <p:cNvPr id="125" name="Conector de Seta Reta 124"/>
+          <p:cNvCxnSpPr/>
+          <p:nvPr/>
+        </p:nvCxnSpPr>
+        <p:spPr>
+          <a:xfrm flipH="1">
+            <a:off x="7881255" y="3429000"/>
+            <a:ext cx="1312013" cy="342462"/>
+          </a:xfrm>
+          <a:prstGeom prst="straightConnector1">
+            <a:avLst/>
+          </a:prstGeom>
+          <a:ln w="76200">
+            <a:headEnd type="triangle"/>
+            <a:tailEnd type="triangle"/>
+          </a:ln>
+        </p:spPr>
+        <p:style>
+          <a:lnRef idx="1">
+            <a:schemeClr val="accent1"/>
+          </a:lnRef>
+          <a:fillRef idx="0">
+            <a:schemeClr val="accent1"/>
+          </a:fillRef>
+          <a:effectRef idx="0">
+            <a:schemeClr val="accent1"/>
+          </a:effectRef>
+          <a:fontRef idx="minor">
+            <a:schemeClr val="tx1"/>
+          </a:fontRef>
+        </p:style>
+      </p:cxnSp>
       <p:sp>
         <p:nvSpPr>
-          <p:cNvPr id="8" name="Retângulo Arredondado 7"/>
+          <p:cNvPr id="128" name="Retângulo 127"/>
           <p:cNvSpPr/>
           <p:nvPr/>
         </p:nvSpPr>
         <p:spPr>
           <a:xfrm>
-            <a:off x="6757916" y="1214650"/>
-            <a:ext cx="2249606" cy="2565779"/>
+            <a:off x="4880971" y="431962"/>
+            <a:ext cx="2450930" cy="528744"/>
           </a:xfrm>
-          <a:prstGeom prst="roundRect">
+          <a:prstGeom prst="rect">
             <a:avLst/>
           </a:prstGeom>
           <a:solidFill>
-            <a:srgbClr val="1D9A78"/>
+            <a:schemeClr val="bg2">
+              <a:lumMod val="90000"/>
+            </a:schemeClr>
           </a:solidFill>
           <a:ln>
-            <a:solidFill>
-              <a:schemeClr val="accent1">
-                <a:lumMod val="50000"/>
-              </a:schemeClr>
-            </a:solidFill>
+            <a:noFill/>
           </a:ln>
         </p:spPr>
         <p:style>
@@ -3576,36 +4587,50 @@
           <a:p>
             <a:pPr algn="ctr"/>
             <a:r>
-              <a:rPr lang="pt-BR" sz="2400" dirty="0" smtClean="0"/>
-              <a:t>Transformação dos dados</a:t>
+              <a:rPr lang="pt-BR" sz="2400" dirty="0" smtClean="0">
+                <a:solidFill>
+                  <a:schemeClr val="bg2">
+                    <a:lumMod val="10000"/>
+                  </a:schemeClr>
+                </a:solidFill>
+                <a:latin typeface="Arial" panose="020B0604020202020204" pitchFamily="34" charset="0"/>
+                <a:cs typeface="Arial" panose="020B0604020202020204" pitchFamily="34" charset="0"/>
+              </a:rPr>
+              <a:t>Desenvolvedor</a:t>
             </a:r>
-            <a:endParaRPr lang="pt-BR" sz="2400" dirty="0"/>
+            <a:endParaRPr lang="pt-BR" sz="2400" dirty="0">
+              <a:solidFill>
+                <a:schemeClr val="bg2">
+                  <a:lumMod val="10000"/>
+                </a:schemeClr>
+              </a:solidFill>
+              <a:latin typeface="Arial" panose="020B0604020202020204" pitchFamily="34" charset="0"/>
+              <a:cs typeface="Arial" panose="020B0604020202020204" pitchFamily="34" charset="0"/>
+            </a:endParaRPr>
           </a:p>
         </p:txBody>
       </p:sp>
       <p:sp>
         <p:nvSpPr>
-          <p:cNvPr id="9" name="Retângulo Arredondado 8"/>
+          <p:cNvPr id="129" name="Retângulo 128"/>
           <p:cNvSpPr/>
           <p:nvPr/>
         </p:nvSpPr>
         <p:spPr>
           <a:xfrm>
-            <a:off x="9623945" y="1214650"/>
-            <a:ext cx="2249606" cy="2565779"/>
+            <a:off x="999786" y="1690893"/>
+            <a:ext cx="2450930" cy="528744"/>
           </a:xfrm>
-          <a:prstGeom prst="roundRect">
+          <a:prstGeom prst="rect">
             <a:avLst/>
           </a:prstGeom>
           <a:solidFill>
-            <a:srgbClr val="1D9A78"/>
+            <a:schemeClr val="bg2">
+              <a:lumMod val="90000"/>
+            </a:schemeClr>
           </a:solidFill>
           <a:ln>
-            <a:solidFill>
-              <a:schemeClr val="accent1">
-                <a:lumMod val="50000"/>
-              </a:schemeClr>
-            </a:solidFill>
+            <a:noFill/>
           </a:ln>
         </p:spPr>
         <p:style>
@@ -3630,283 +4655,3383 @@
           <a:p>
             <a:pPr algn="ctr"/>
             <a:r>
-              <a:rPr lang="pt-BR" sz="2400" dirty="0" smtClean="0"/>
-              <a:t>Mineração dos dados</a:t>
+              <a:rPr lang="pt-BR" sz="2400" dirty="0" smtClean="0">
+                <a:solidFill>
+                  <a:schemeClr val="bg2">
+                    <a:lumMod val="10000"/>
+                  </a:schemeClr>
+                </a:solidFill>
+                <a:latin typeface="Arial" panose="020B0604020202020204" pitchFamily="34" charset="0"/>
+                <a:cs typeface="Arial" panose="020B0604020202020204" pitchFamily="34" charset="0"/>
+              </a:rPr>
+              <a:t>Desenvolvedor</a:t>
             </a:r>
-            <a:endParaRPr lang="pt-BR" sz="2400" dirty="0"/>
-          </a:p>
-        </p:txBody>
-      </p:sp>
-      <p:sp>
-        <p:nvSpPr>
-          <p:cNvPr id="10" name="Retângulo Arredondado 9"/>
-          <p:cNvSpPr/>
-          <p:nvPr/>
-        </p:nvSpPr>
-        <p:spPr>
-          <a:xfrm>
-            <a:off x="12489974" y="1214649"/>
-            <a:ext cx="2249606" cy="2565779"/>
-          </a:xfrm>
-          <a:prstGeom prst="roundRect">
-            <a:avLst/>
-          </a:prstGeom>
-          <a:solidFill>
-            <a:srgbClr val="1D9A78"/>
-          </a:solidFill>
-          <a:ln>
-            <a:solidFill>
-              <a:schemeClr val="accent1">
-                <a:lumMod val="50000"/>
-              </a:schemeClr>
-            </a:solidFill>
-          </a:ln>
-        </p:spPr>
-        <p:style>
-          <a:lnRef idx="2">
-            <a:schemeClr val="accent1">
-              <a:shade val="50000"/>
-            </a:schemeClr>
-          </a:lnRef>
-          <a:fillRef idx="1">
-            <a:schemeClr val="accent1"/>
-          </a:fillRef>
-          <a:effectRef idx="0">
-            <a:schemeClr val="accent1"/>
-          </a:effectRef>
-          <a:fontRef idx="minor">
-            <a:schemeClr val="lt1"/>
-          </a:fontRef>
-        </p:style>
-        <p:txBody>
-          <a:bodyPr rtlCol="0" anchor="ctr"/>
-          <a:lstStyle/>
-          <a:p>
-            <a:pPr algn="ctr"/>
-            <a:r>
-              <a:rPr lang="pt-BR" sz="2400" dirty="0" smtClean="0"/>
-              <a:t>Interpretação e avaliação dos resultados</a:t>
-            </a:r>
-            <a:endParaRPr lang="pt-BR" sz="2400" dirty="0"/>
-          </a:p>
-        </p:txBody>
-      </p:sp>
-      <p:sp>
-        <p:nvSpPr>
-          <p:cNvPr id="12" name="Seta para a Direita 11"/>
-          <p:cNvSpPr/>
-          <p:nvPr/>
-        </p:nvSpPr>
-        <p:spPr>
-          <a:xfrm>
-            <a:off x="2988860" y="2147294"/>
-            <a:ext cx="616423" cy="700488"/>
-          </a:xfrm>
-          <a:prstGeom prst="rightArrow">
-            <a:avLst>
-              <a:gd name="adj1" fmla="val 50000"/>
-              <a:gd name="adj2" fmla="val 65834"/>
-            </a:avLst>
-          </a:prstGeom>
-          <a:solidFill>
-            <a:schemeClr val="accent2"/>
-          </a:solidFill>
-          <a:ln>
-            <a:solidFill>
-              <a:schemeClr val="accent2">
-                <a:lumMod val="50000"/>
-              </a:schemeClr>
-            </a:solidFill>
-          </a:ln>
-        </p:spPr>
-        <p:style>
-          <a:lnRef idx="2">
-            <a:schemeClr val="accent1">
-              <a:shade val="50000"/>
-            </a:schemeClr>
-          </a:lnRef>
-          <a:fillRef idx="1">
-            <a:schemeClr val="accent1"/>
-          </a:fillRef>
-          <a:effectRef idx="0">
-            <a:schemeClr val="accent1"/>
-          </a:effectRef>
-          <a:fontRef idx="minor">
-            <a:schemeClr val="lt1"/>
-          </a:fontRef>
-        </p:style>
-        <p:txBody>
-          <a:bodyPr rtlCol="0" anchor="ctr"/>
-          <a:lstStyle/>
-          <a:p>
-            <a:pPr algn="ctr"/>
-            <a:endParaRPr lang="pt-BR"/>
-          </a:p>
-        </p:txBody>
-      </p:sp>
-      <p:sp>
-        <p:nvSpPr>
-          <p:cNvPr id="13" name="Seta para a Direita 12"/>
-          <p:cNvSpPr/>
-          <p:nvPr/>
-        </p:nvSpPr>
-        <p:spPr>
-          <a:xfrm>
-            <a:off x="6142236" y="2147294"/>
-            <a:ext cx="616423" cy="700488"/>
-          </a:xfrm>
-          <a:prstGeom prst="rightArrow">
-            <a:avLst>
-              <a:gd name="adj1" fmla="val 50000"/>
-              <a:gd name="adj2" fmla="val 65834"/>
-            </a:avLst>
-          </a:prstGeom>
-          <a:solidFill>
-            <a:schemeClr val="accent2"/>
-          </a:solidFill>
-          <a:ln>
-            <a:solidFill>
-              <a:schemeClr val="accent2">
-                <a:lumMod val="50000"/>
-              </a:schemeClr>
-            </a:solidFill>
-          </a:ln>
-        </p:spPr>
-        <p:style>
-          <a:lnRef idx="2">
-            <a:schemeClr val="accent1">
-              <a:shade val="50000"/>
-            </a:schemeClr>
-          </a:lnRef>
-          <a:fillRef idx="1">
-            <a:schemeClr val="accent1"/>
-          </a:fillRef>
-          <a:effectRef idx="0">
-            <a:schemeClr val="accent1"/>
-          </a:effectRef>
-          <a:fontRef idx="minor">
-            <a:schemeClr val="lt1"/>
-          </a:fontRef>
-        </p:style>
-        <p:txBody>
-          <a:bodyPr rtlCol="0" anchor="ctr"/>
-          <a:lstStyle/>
-          <a:p>
-            <a:pPr algn="ctr"/>
-            <a:endParaRPr lang="pt-BR"/>
-          </a:p>
-        </p:txBody>
-      </p:sp>
-      <p:sp>
-        <p:nvSpPr>
-          <p:cNvPr id="14" name="Seta para a Direita 13"/>
-          <p:cNvSpPr/>
-          <p:nvPr/>
-        </p:nvSpPr>
-        <p:spPr>
-          <a:xfrm>
-            <a:off x="9010079" y="2147294"/>
-            <a:ext cx="616423" cy="700488"/>
-          </a:xfrm>
-          <a:prstGeom prst="rightArrow">
-            <a:avLst>
-              <a:gd name="adj1" fmla="val 50000"/>
-              <a:gd name="adj2" fmla="val 65834"/>
-            </a:avLst>
-          </a:prstGeom>
-          <a:solidFill>
-            <a:schemeClr val="accent2"/>
-          </a:solidFill>
-          <a:ln>
-            <a:solidFill>
-              <a:schemeClr val="accent2">
-                <a:lumMod val="50000"/>
-              </a:schemeClr>
-            </a:solidFill>
-          </a:ln>
-        </p:spPr>
-        <p:style>
-          <a:lnRef idx="2">
-            <a:schemeClr val="accent1">
-              <a:shade val="50000"/>
-            </a:schemeClr>
-          </a:lnRef>
-          <a:fillRef idx="1">
-            <a:schemeClr val="accent1"/>
-          </a:fillRef>
-          <a:effectRef idx="0">
-            <a:schemeClr val="accent1"/>
-          </a:effectRef>
-          <a:fontRef idx="minor">
-            <a:schemeClr val="lt1"/>
-          </a:fontRef>
-        </p:style>
-        <p:txBody>
-          <a:bodyPr rtlCol="0" anchor="ctr"/>
-          <a:lstStyle/>
-          <a:p>
-            <a:pPr algn="ctr"/>
-            <a:endParaRPr lang="pt-BR"/>
-          </a:p>
-        </p:txBody>
-      </p:sp>
-      <p:sp>
-        <p:nvSpPr>
-          <p:cNvPr id="15" name="Seta para a Direita 14"/>
-          <p:cNvSpPr/>
-          <p:nvPr/>
-        </p:nvSpPr>
-        <p:spPr>
-          <a:xfrm>
-            <a:off x="11871088" y="2147294"/>
-            <a:ext cx="616423" cy="700488"/>
-          </a:xfrm>
-          <a:prstGeom prst="rightArrow">
-            <a:avLst>
-              <a:gd name="adj1" fmla="val 50000"/>
-              <a:gd name="adj2" fmla="val 65834"/>
-            </a:avLst>
-          </a:prstGeom>
-          <a:solidFill>
-            <a:schemeClr val="accent2"/>
-          </a:solidFill>
-          <a:ln>
-            <a:solidFill>
-              <a:schemeClr val="accent2">
-                <a:lumMod val="50000"/>
-              </a:schemeClr>
-            </a:solidFill>
-          </a:ln>
-        </p:spPr>
-        <p:style>
-          <a:lnRef idx="2">
-            <a:schemeClr val="accent1">
-              <a:shade val="50000"/>
-            </a:schemeClr>
-          </a:lnRef>
-          <a:fillRef idx="1">
-            <a:schemeClr val="accent1"/>
-          </a:fillRef>
-          <a:effectRef idx="0">
-            <a:schemeClr val="accent1"/>
-          </a:effectRef>
-          <a:fontRef idx="minor">
-            <a:schemeClr val="lt1"/>
-          </a:fontRef>
-        </p:style>
-        <p:txBody>
-          <a:bodyPr rtlCol="0" anchor="ctr"/>
-          <a:lstStyle/>
-          <a:p>
-            <a:pPr algn="ctr"/>
-            <a:endParaRPr lang="pt-BR"/>
+            <a:endParaRPr lang="pt-BR" sz="2400" dirty="0">
+              <a:solidFill>
+                <a:schemeClr val="bg2">
+                  <a:lumMod val="10000"/>
+                </a:schemeClr>
+              </a:solidFill>
+              <a:latin typeface="Arial" panose="020B0604020202020204" pitchFamily="34" charset="0"/>
+              <a:cs typeface="Arial" panose="020B0604020202020204" pitchFamily="34" charset="0"/>
+            </a:endParaRPr>
           </a:p>
         </p:txBody>
       </p:sp>
     </p:spTree>
     <p:extLst>
       <p:ext uri="{BB962C8B-B14F-4D97-AF65-F5344CB8AC3E}">
-        <p14:creationId xmlns:p14="http://schemas.microsoft.com/office/powerpoint/2010/main" val="296841696"/>
+        <p14:creationId xmlns:p14="http://schemas.microsoft.com/office/powerpoint/2010/main" val="3309111227"/>
+      </p:ext>
+    </p:extLst>
+  </p:cSld>
+  <p:clrMapOvr>
+    <a:masterClrMapping/>
+  </p:clrMapOvr>
+</p:sld>
+</file>
+
+<file path=ppt/slides/slide3.xml><?xml version="1.0" encoding="utf-8"?>
+<p:sld xmlns:a="http://schemas.openxmlformats.org/drawingml/2006/main" xmlns:r="http://schemas.openxmlformats.org/officeDocument/2006/relationships" xmlns:p="http://schemas.openxmlformats.org/presentationml/2006/main">
+  <p:cSld>
+    <p:spTree>
+      <p:nvGrpSpPr>
+        <p:cNvPr id="1" name=""/>
+        <p:cNvGrpSpPr/>
+        <p:nvPr/>
+      </p:nvGrpSpPr>
+      <p:grpSpPr>
+        <a:xfrm>
+          <a:off x="0" y="0"/>
+          <a:ext cx="0" cy="0"/>
+          <a:chOff x="0" y="0"/>
+          <a:chExt cx="0" cy="0"/>
+        </a:xfrm>
+      </p:grpSpPr>
+      <p:pic>
+        <p:nvPicPr>
+          <p:cNvPr id="4" name="Imagem 3"/>
+          <p:cNvPicPr>
+            <a:picLocks noChangeAspect="1"/>
+          </p:cNvPicPr>
+          <p:nvPr/>
+        </p:nvPicPr>
+        <p:blipFill>
+          <a:blip r:embed="rId2">
+            <a:extLst>
+              <a:ext uri="{28A0092B-C50C-407E-A947-70E740481C1C}">
+                <a14:useLocalDpi xmlns:a14="http://schemas.microsoft.com/office/drawing/2010/main" val="0"/>
+              </a:ext>
+            </a:extLst>
+          </a:blip>
+          <a:stretch>
+            <a:fillRect/>
+          </a:stretch>
+        </p:blipFill>
+        <p:spPr>
+          <a:xfrm>
+            <a:off x="730962" y="784515"/>
+            <a:ext cx="4725059" cy="1276528"/>
+          </a:xfrm>
+          <a:prstGeom prst="rect">
+            <a:avLst/>
+          </a:prstGeom>
+        </p:spPr>
+      </p:pic>
+    </p:spTree>
+    <p:extLst>
+      <p:ext uri="{BB962C8B-B14F-4D97-AF65-F5344CB8AC3E}">
+        <p14:creationId xmlns:p14="http://schemas.microsoft.com/office/powerpoint/2010/main" val="666603160"/>
+      </p:ext>
+    </p:extLst>
+  </p:cSld>
+  <p:clrMapOvr>
+    <a:masterClrMapping/>
+  </p:clrMapOvr>
+</p:sld>
+</file>
+
+<file path=ppt/slides/slide4.xml><?xml version="1.0" encoding="utf-8"?>
+<p:sld xmlns:a="http://schemas.openxmlformats.org/drawingml/2006/main" xmlns:r="http://schemas.openxmlformats.org/officeDocument/2006/relationships" xmlns:p="http://schemas.openxmlformats.org/presentationml/2006/main">
+  <p:cSld>
+    <p:spTree>
+      <p:nvGrpSpPr>
+        <p:cNvPr id="1" name=""/>
+        <p:cNvGrpSpPr/>
+        <p:nvPr/>
+      </p:nvGrpSpPr>
+      <p:grpSpPr>
+        <a:xfrm>
+          <a:off x="0" y="0"/>
+          <a:ext cx="0" cy="0"/>
+          <a:chOff x="0" y="0"/>
+          <a:chExt cx="0" cy="0"/>
+        </a:xfrm>
+      </p:grpSpPr>
+      <p:grpSp>
+        <p:nvGrpSpPr>
+          <p:cNvPr id="4" name="Agrupar 3"/>
+          <p:cNvGrpSpPr/>
+          <p:nvPr/>
+        </p:nvGrpSpPr>
+        <p:grpSpPr>
+          <a:xfrm>
+            <a:off x="698832" y="723815"/>
+            <a:ext cx="12102768" cy="5996535"/>
+            <a:chOff x="595223" y="1714415"/>
+            <a:chExt cx="7263070" cy="3094298"/>
+          </a:xfrm>
+        </p:grpSpPr>
+        <p:grpSp>
+          <p:nvGrpSpPr>
+            <p:cNvPr id="5" name="Agrupar 4"/>
+            <p:cNvGrpSpPr/>
+            <p:nvPr/>
+          </p:nvGrpSpPr>
+          <p:grpSpPr>
+            <a:xfrm>
+              <a:off x="661296" y="4233739"/>
+              <a:ext cx="874513" cy="337458"/>
+              <a:chOff x="644044" y="4121601"/>
+              <a:chExt cx="874513" cy="337458"/>
+            </a:xfrm>
+          </p:grpSpPr>
+          <p:sp>
+            <p:nvSpPr>
+              <p:cNvPr id="82" name="Cilindro 81"/>
+              <p:cNvSpPr/>
+              <p:nvPr/>
+            </p:nvSpPr>
+            <p:spPr>
+              <a:xfrm>
+                <a:off x="1175657" y="4234542"/>
+                <a:ext cx="342900" cy="149678"/>
+              </a:xfrm>
+              <a:prstGeom prst="can">
+                <a:avLst>
+                  <a:gd name="adj" fmla="val 50000"/>
+                </a:avLst>
+              </a:prstGeom>
+            </p:spPr>
+            <p:style>
+              <a:lnRef idx="2">
+                <a:schemeClr val="accent3">
+                  <a:shade val="50000"/>
+                </a:schemeClr>
+              </a:lnRef>
+              <a:fillRef idx="1">
+                <a:schemeClr val="accent3"/>
+              </a:fillRef>
+              <a:effectRef idx="0">
+                <a:schemeClr val="accent3"/>
+              </a:effectRef>
+              <a:fontRef idx="minor">
+                <a:schemeClr val="lt1"/>
+              </a:fontRef>
+            </p:style>
+            <p:txBody>
+              <a:bodyPr rtlCol="0" anchor="ctr"/>
+              <a:lstStyle/>
+              <a:p>
+                <a:pPr algn="ctr"/>
+                <a:endParaRPr lang="pt-BR">
+                  <a:latin typeface="Arial" panose="020B0604020202020204" pitchFamily="34" charset="0"/>
+                  <a:cs typeface="Arial" panose="020B0604020202020204" pitchFamily="34" charset="0"/>
+                </a:endParaRPr>
+              </a:p>
+            </p:txBody>
+          </p:sp>
+          <p:sp>
+            <p:nvSpPr>
+              <p:cNvPr id="83" name="Cilindro 82"/>
+              <p:cNvSpPr/>
+              <p:nvPr/>
+            </p:nvSpPr>
+            <p:spPr>
+              <a:xfrm>
+                <a:off x="644044" y="4276378"/>
+                <a:ext cx="342900" cy="149678"/>
+              </a:xfrm>
+              <a:prstGeom prst="can">
+                <a:avLst>
+                  <a:gd name="adj" fmla="val 50000"/>
+                </a:avLst>
+              </a:prstGeom>
+            </p:spPr>
+            <p:style>
+              <a:lnRef idx="2">
+                <a:schemeClr val="accent4">
+                  <a:shade val="50000"/>
+                </a:schemeClr>
+              </a:lnRef>
+              <a:fillRef idx="1">
+                <a:schemeClr val="accent4"/>
+              </a:fillRef>
+              <a:effectRef idx="0">
+                <a:schemeClr val="accent4"/>
+              </a:effectRef>
+              <a:fontRef idx="minor">
+                <a:schemeClr val="lt1"/>
+              </a:fontRef>
+            </p:style>
+            <p:txBody>
+              <a:bodyPr rtlCol="0" anchor="ctr"/>
+              <a:lstStyle/>
+              <a:p>
+                <a:pPr algn="ctr"/>
+                <a:endParaRPr lang="pt-BR">
+                  <a:latin typeface="Arial" panose="020B0604020202020204" pitchFamily="34" charset="0"/>
+                  <a:cs typeface="Arial" panose="020B0604020202020204" pitchFamily="34" charset="0"/>
+                </a:endParaRPr>
+              </a:p>
+            </p:txBody>
+          </p:sp>
+          <p:sp>
+            <p:nvSpPr>
+              <p:cNvPr id="84" name="Cilindro 83"/>
+              <p:cNvSpPr/>
+              <p:nvPr/>
+            </p:nvSpPr>
+            <p:spPr>
+              <a:xfrm>
+                <a:off x="928007" y="4121601"/>
+                <a:ext cx="342900" cy="149678"/>
+              </a:xfrm>
+              <a:prstGeom prst="can">
+                <a:avLst>
+                  <a:gd name="adj" fmla="val 50000"/>
+                </a:avLst>
+              </a:prstGeom>
+            </p:spPr>
+            <p:style>
+              <a:lnRef idx="2">
+                <a:schemeClr val="accent6">
+                  <a:shade val="50000"/>
+                </a:schemeClr>
+              </a:lnRef>
+              <a:fillRef idx="1">
+                <a:schemeClr val="accent6"/>
+              </a:fillRef>
+              <a:effectRef idx="0">
+                <a:schemeClr val="accent6"/>
+              </a:effectRef>
+              <a:fontRef idx="minor">
+                <a:schemeClr val="lt1"/>
+              </a:fontRef>
+            </p:style>
+            <p:txBody>
+              <a:bodyPr rtlCol="0" anchor="ctr"/>
+              <a:lstStyle/>
+              <a:p>
+                <a:pPr algn="ctr"/>
+                <a:endParaRPr lang="pt-BR">
+                  <a:latin typeface="Arial" panose="020B0604020202020204" pitchFamily="34" charset="0"/>
+                  <a:cs typeface="Arial" panose="020B0604020202020204" pitchFamily="34" charset="0"/>
+                </a:endParaRPr>
+              </a:p>
+            </p:txBody>
+          </p:sp>
+          <p:sp>
+            <p:nvSpPr>
+              <p:cNvPr id="85" name="Cilindro 84"/>
+              <p:cNvSpPr/>
+              <p:nvPr/>
+            </p:nvSpPr>
+            <p:spPr>
+              <a:xfrm>
+                <a:off x="971889" y="4309381"/>
+                <a:ext cx="342900" cy="149678"/>
+              </a:xfrm>
+              <a:prstGeom prst="can">
+                <a:avLst>
+                  <a:gd name="adj" fmla="val 50000"/>
+                </a:avLst>
+              </a:prstGeom>
+            </p:spPr>
+            <p:style>
+              <a:lnRef idx="2">
+                <a:schemeClr val="accent6">
+                  <a:shade val="50000"/>
+                </a:schemeClr>
+              </a:lnRef>
+              <a:fillRef idx="1">
+                <a:schemeClr val="accent6"/>
+              </a:fillRef>
+              <a:effectRef idx="0">
+                <a:schemeClr val="accent6"/>
+              </a:effectRef>
+              <a:fontRef idx="minor">
+                <a:schemeClr val="lt1"/>
+              </a:fontRef>
+            </p:style>
+            <p:txBody>
+              <a:bodyPr rtlCol="0" anchor="ctr"/>
+              <a:lstStyle/>
+              <a:p>
+                <a:pPr algn="ctr"/>
+                <a:endParaRPr lang="pt-BR">
+                  <a:latin typeface="Arial" panose="020B0604020202020204" pitchFamily="34" charset="0"/>
+                  <a:cs typeface="Arial" panose="020B0604020202020204" pitchFamily="34" charset="0"/>
+                </a:endParaRPr>
+              </a:p>
+            </p:txBody>
+          </p:sp>
+          <p:sp>
+            <p:nvSpPr>
+              <p:cNvPr id="86" name="Cilindro 85"/>
+              <p:cNvSpPr/>
+              <p:nvPr/>
+            </p:nvSpPr>
+            <p:spPr>
+              <a:xfrm>
+                <a:off x="1099457" y="4196440"/>
+                <a:ext cx="342900" cy="149678"/>
+              </a:xfrm>
+              <a:prstGeom prst="can">
+                <a:avLst>
+                  <a:gd name="adj" fmla="val 50000"/>
+                </a:avLst>
+              </a:prstGeom>
+            </p:spPr>
+            <p:style>
+              <a:lnRef idx="2">
+                <a:schemeClr val="accent5">
+                  <a:shade val="50000"/>
+                </a:schemeClr>
+              </a:lnRef>
+              <a:fillRef idx="1">
+                <a:schemeClr val="accent5"/>
+              </a:fillRef>
+              <a:effectRef idx="0">
+                <a:schemeClr val="accent5"/>
+              </a:effectRef>
+              <a:fontRef idx="minor">
+                <a:schemeClr val="lt1"/>
+              </a:fontRef>
+            </p:style>
+            <p:txBody>
+              <a:bodyPr rtlCol="0" anchor="ctr"/>
+              <a:lstStyle/>
+              <a:p>
+                <a:pPr algn="ctr"/>
+                <a:endParaRPr lang="pt-BR">
+                  <a:latin typeface="Arial" panose="020B0604020202020204" pitchFamily="34" charset="0"/>
+                  <a:cs typeface="Arial" panose="020B0604020202020204" pitchFamily="34" charset="0"/>
+                </a:endParaRPr>
+              </a:p>
+            </p:txBody>
+          </p:sp>
+          <p:sp>
+            <p:nvSpPr>
+              <p:cNvPr id="87" name="Cilindro 86"/>
+              <p:cNvSpPr/>
+              <p:nvPr/>
+            </p:nvSpPr>
+            <p:spPr>
+              <a:xfrm>
+                <a:off x="746862" y="4196440"/>
+                <a:ext cx="342900" cy="149678"/>
+              </a:xfrm>
+              <a:prstGeom prst="can">
+                <a:avLst>
+                  <a:gd name="adj" fmla="val 50000"/>
+                </a:avLst>
+              </a:prstGeom>
+            </p:spPr>
+            <p:style>
+              <a:lnRef idx="2">
+                <a:schemeClr val="accent3">
+                  <a:shade val="50000"/>
+                </a:schemeClr>
+              </a:lnRef>
+              <a:fillRef idx="1">
+                <a:schemeClr val="accent3"/>
+              </a:fillRef>
+              <a:effectRef idx="0">
+                <a:schemeClr val="accent3"/>
+              </a:effectRef>
+              <a:fontRef idx="minor">
+                <a:schemeClr val="lt1"/>
+              </a:fontRef>
+            </p:style>
+            <p:txBody>
+              <a:bodyPr rtlCol="0" anchor="ctr"/>
+              <a:lstStyle/>
+              <a:p>
+                <a:pPr algn="ctr"/>
+                <a:endParaRPr lang="pt-BR">
+                  <a:latin typeface="Arial" panose="020B0604020202020204" pitchFamily="34" charset="0"/>
+                  <a:cs typeface="Arial" panose="020B0604020202020204" pitchFamily="34" charset="0"/>
+                </a:endParaRPr>
+              </a:p>
+            </p:txBody>
+          </p:sp>
+        </p:grpSp>
+        <p:grpSp>
+          <p:nvGrpSpPr>
+            <p:cNvPr id="6" name="Agrupar 5"/>
+            <p:cNvGrpSpPr/>
+            <p:nvPr/>
+          </p:nvGrpSpPr>
+          <p:grpSpPr>
+            <a:xfrm>
+              <a:off x="2080532" y="3719765"/>
+              <a:ext cx="622300" cy="410481"/>
+              <a:chOff x="2080532" y="3685261"/>
+              <a:chExt cx="622300" cy="410481"/>
+            </a:xfrm>
+          </p:grpSpPr>
+          <p:sp>
+            <p:nvSpPr>
+              <p:cNvPr id="76" name="Cilindro 75"/>
+              <p:cNvSpPr/>
+              <p:nvPr/>
+            </p:nvSpPr>
+            <p:spPr>
+              <a:xfrm>
+                <a:off x="2359932" y="3760100"/>
+                <a:ext cx="342900" cy="149678"/>
+              </a:xfrm>
+              <a:prstGeom prst="can">
+                <a:avLst>
+                  <a:gd name="adj" fmla="val 50000"/>
+                </a:avLst>
+              </a:prstGeom>
+            </p:spPr>
+            <p:style>
+              <a:lnRef idx="2">
+                <a:schemeClr val="accent3">
+                  <a:shade val="50000"/>
+                </a:schemeClr>
+              </a:lnRef>
+              <a:fillRef idx="1">
+                <a:schemeClr val="accent3"/>
+              </a:fillRef>
+              <a:effectRef idx="0">
+                <a:schemeClr val="accent3"/>
+              </a:effectRef>
+              <a:fontRef idx="minor">
+                <a:schemeClr val="lt1"/>
+              </a:fontRef>
+            </p:style>
+            <p:txBody>
+              <a:bodyPr rtlCol="0" anchor="ctr"/>
+              <a:lstStyle/>
+              <a:p>
+                <a:pPr algn="ctr"/>
+                <a:endParaRPr lang="pt-BR">
+                  <a:latin typeface="Arial" panose="020B0604020202020204" pitchFamily="34" charset="0"/>
+                  <a:cs typeface="Arial" panose="020B0604020202020204" pitchFamily="34" charset="0"/>
+                </a:endParaRPr>
+              </a:p>
+            </p:txBody>
+          </p:sp>
+          <p:sp>
+            <p:nvSpPr>
+              <p:cNvPr id="77" name="Cilindro 76"/>
+              <p:cNvSpPr/>
+              <p:nvPr/>
+            </p:nvSpPr>
+            <p:spPr>
+              <a:xfrm>
+                <a:off x="2080532" y="3826775"/>
+                <a:ext cx="342900" cy="149678"/>
+              </a:xfrm>
+              <a:prstGeom prst="can">
+                <a:avLst>
+                  <a:gd name="adj" fmla="val 50000"/>
+                </a:avLst>
+              </a:prstGeom>
+            </p:spPr>
+            <p:style>
+              <a:lnRef idx="2">
+                <a:schemeClr val="accent6">
+                  <a:shade val="50000"/>
+                </a:schemeClr>
+              </a:lnRef>
+              <a:fillRef idx="1">
+                <a:schemeClr val="accent6"/>
+              </a:fillRef>
+              <a:effectRef idx="0">
+                <a:schemeClr val="accent6"/>
+              </a:effectRef>
+              <a:fontRef idx="minor">
+                <a:schemeClr val="lt1"/>
+              </a:fontRef>
+            </p:style>
+            <p:txBody>
+              <a:bodyPr rtlCol="0" anchor="ctr"/>
+              <a:lstStyle/>
+              <a:p>
+                <a:pPr algn="ctr"/>
+                <a:endParaRPr lang="pt-BR">
+                  <a:latin typeface="Arial" panose="020B0604020202020204" pitchFamily="34" charset="0"/>
+                  <a:cs typeface="Arial" panose="020B0604020202020204" pitchFamily="34" charset="0"/>
+                </a:endParaRPr>
+              </a:p>
+            </p:txBody>
+          </p:sp>
+          <p:sp>
+            <p:nvSpPr>
+              <p:cNvPr id="78" name="Cilindro 77"/>
+              <p:cNvSpPr/>
+              <p:nvPr/>
+            </p:nvSpPr>
+            <p:spPr>
+              <a:xfrm>
+                <a:off x="2359932" y="3685261"/>
+                <a:ext cx="342900" cy="149678"/>
+              </a:xfrm>
+              <a:prstGeom prst="can">
+                <a:avLst>
+                  <a:gd name="adj" fmla="val 50000"/>
+                </a:avLst>
+              </a:prstGeom>
+            </p:spPr>
+            <p:style>
+              <a:lnRef idx="2">
+                <a:schemeClr val="accent3">
+                  <a:shade val="50000"/>
+                </a:schemeClr>
+              </a:lnRef>
+              <a:fillRef idx="1">
+                <a:schemeClr val="accent3"/>
+              </a:fillRef>
+              <a:effectRef idx="0">
+                <a:schemeClr val="accent3"/>
+              </a:effectRef>
+              <a:fontRef idx="minor">
+                <a:schemeClr val="lt1"/>
+              </a:fontRef>
+            </p:style>
+            <p:txBody>
+              <a:bodyPr rtlCol="0" anchor="ctr"/>
+              <a:lstStyle/>
+              <a:p>
+                <a:pPr algn="ctr"/>
+                <a:endParaRPr lang="pt-BR">
+                  <a:latin typeface="Arial" panose="020B0604020202020204" pitchFamily="34" charset="0"/>
+                  <a:cs typeface="Arial" panose="020B0604020202020204" pitchFamily="34" charset="0"/>
+                </a:endParaRPr>
+              </a:p>
+            </p:txBody>
+          </p:sp>
+          <p:sp>
+            <p:nvSpPr>
+              <p:cNvPr id="79" name="Cilindro 78"/>
+              <p:cNvSpPr/>
+              <p:nvPr/>
+            </p:nvSpPr>
+            <p:spPr>
+              <a:xfrm>
+                <a:off x="2080532" y="3759649"/>
+                <a:ext cx="342900" cy="149678"/>
+              </a:xfrm>
+              <a:prstGeom prst="can">
+                <a:avLst>
+                  <a:gd name="adj" fmla="val 50000"/>
+                </a:avLst>
+              </a:prstGeom>
+            </p:spPr>
+            <p:style>
+              <a:lnRef idx="2">
+                <a:schemeClr val="accent6">
+                  <a:shade val="50000"/>
+                </a:schemeClr>
+              </a:lnRef>
+              <a:fillRef idx="1">
+                <a:schemeClr val="accent6"/>
+              </a:fillRef>
+              <a:effectRef idx="0">
+                <a:schemeClr val="accent6"/>
+              </a:effectRef>
+              <a:fontRef idx="minor">
+                <a:schemeClr val="lt1"/>
+              </a:fontRef>
+            </p:style>
+            <p:txBody>
+              <a:bodyPr rtlCol="0" anchor="ctr"/>
+              <a:lstStyle/>
+              <a:p>
+                <a:pPr algn="ctr"/>
+                <a:endParaRPr lang="pt-BR">
+                  <a:latin typeface="Arial" panose="020B0604020202020204" pitchFamily="34" charset="0"/>
+                  <a:cs typeface="Arial" panose="020B0604020202020204" pitchFamily="34" charset="0"/>
+                </a:endParaRPr>
+              </a:p>
+            </p:txBody>
+          </p:sp>
+          <p:sp>
+            <p:nvSpPr>
+              <p:cNvPr id="80" name="Cilindro 79"/>
+              <p:cNvSpPr/>
+              <p:nvPr/>
+            </p:nvSpPr>
+            <p:spPr>
+              <a:xfrm>
+                <a:off x="2293257" y="3946064"/>
+                <a:ext cx="342900" cy="149678"/>
+              </a:xfrm>
+              <a:prstGeom prst="can">
+                <a:avLst>
+                  <a:gd name="adj" fmla="val 50000"/>
+                </a:avLst>
+              </a:prstGeom>
+            </p:spPr>
+            <p:style>
+              <a:lnRef idx="2">
+                <a:schemeClr val="accent4">
+                  <a:shade val="50000"/>
+                </a:schemeClr>
+              </a:lnRef>
+              <a:fillRef idx="1">
+                <a:schemeClr val="accent4"/>
+              </a:fillRef>
+              <a:effectRef idx="0">
+                <a:schemeClr val="accent4"/>
+              </a:effectRef>
+              <a:fontRef idx="minor">
+                <a:schemeClr val="lt1"/>
+              </a:fontRef>
+            </p:style>
+            <p:txBody>
+              <a:bodyPr rtlCol="0" anchor="ctr"/>
+              <a:lstStyle/>
+              <a:p>
+                <a:pPr algn="ctr"/>
+                <a:endParaRPr lang="pt-BR">
+                  <a:latin typeface="Arial" panose="020B0604020202020204" pitchFamily="34" charset="0"/>
+                  <a:cs typeface="Arial" panose="020B0604020202020204" pitchFamily="34" charset="0"/>
+                </a:endParaRPr>
+              </a:p>
+            </p:txBody>
+          </p:sp>
+          <p:sp>
+            <p:nvSpPr>
+              <p:cNvPr id="81" name="Cilindro 80"/>
+              <p:cNvSpPr/>
+              <p:nvPr/>
+            </p:nvSpPr>
+            <p:spPr>
+              <a:xfrm>
+                <a:off x="2293257" y="3871225"/>
+                <a:ext cx="342900" cy="149678"/>
+              </a:xfrm>
+              <a:prstGeom prst="can">
+                <a:avLst>
+                  <a:gd name="adj" fmla="val 50000"/>
+                </a:avLst>
+              </a:prstGeom>
+            </p:spPr>
+            <p:style>
+              <a:lnRef idx="2">
+                <a:schemeClr val="accent4">
+                  <a:shade val="50000"/>
+                </a:schemeClr>
+              </a:lnRef>
+              <a:fillRef idx="1">
+                <a:schemeClr val="accent4"/>
+              </a:fillRef>
+              <a:effectRef idx="0">
+                <a:schemeClr val="accent4"/>
+              </a:effectRef>
+              <a:fontRef idx="minor">
+                <a:schemeClr val="lt1"/>
+              </a:fontRef>
+            </p:style>
+            <p:txBody>
+              <a:bodyPr rtlCol="0" anchor="ctr"/>
+              <a:lstStyle/>
+              <a:p>
+                <a:pPr algn="ctr"/>
+                <a:endParaRPr lang="pt-BR">
+                  <a:latin typeface="Arial" panose="020B0604020202020204" pitchFamily="34" charset="0"/>
+                  <a:cs typeface="Arial" panose="020B0604020202020204" pitchFamily="34" charset="0"/>
+                </a:endParaRPr>
+              </a:p>
+            </p:txBody>
+          </p:sp>
+        </p:grpSp>
+        <p:grpSp>
+          <p:nvGrpSpPr>
+            <p:cNvPr id="7" name="Agrupar 6"/>
+            <p:cNvGrpSpPr/>
+            <p:nvPr/>
+          </p:nvGrpSpPr>
+          <p:grpSpPr>
+            <a:xfrm>
+              <a:off x="3325129" y="3262931"/>
+              <a:ext cx="622300" cy="410481"/>
+              <a:chOff x="3353707" y="3304261"/>
+              <a:chExt cx="622300" cy="410481"/>
+            </a:xfrm>
+          </p:grpSpPr>
+          <p:sp>
+            <p:nvSpPr>
+              <p:cNvPr id="70" name="Cilindro 69"/>
+              <p:cNvSpPr/>
+              <p:nvPr/>
+            </p:nvSpPr>
+            <p:spPr>
+              <a:xfrm>
+                <a:off x="3633107" y="3379100"/>
+                <a:ext cx="342900" cy="149678"/>
+              </a:xfrm>
+              <a:prstGeom prst="can">
+                <a:avLst>
+                  <a:gd name="adj" fmla="val 50000"/>
+                </a:avLst>
+              </a:prstGeom>
+            </p:spPr>
+            <p:style>
+              <a:lnRef idx="2">
+                <a:schemeClr val="accent1">
+                  <a:shade val="50000"/>
+                </a:schemeClr>
+              </a:lnRef>
+              <a:fillRef idx="1">
+                <a:schemeClr val="accent1"/>
+              </a:fillRef>
+              <a:effectRef idx="0">
+                <a:schemeClr val="accent1"/>
+              </a:effectRef>
+              <a:fontRef idx="minor">
+                <a:schemeClr val="lt1"/>
+              </a:fontRef>
+            </p:style>
+            <p:txBody>
+              <a:bodyPr rtlCol="0" anchor="ctr"/>
+              <a:lstStyle/>
+              <a:p>
+                <a:pPr algn="ctr"/>
+                <a:endParaRPr lang="pt-BR">
+                  <a:latin typeface="Arial" panose="020B0604020202020204" pitchFamily="34" charset="0"/>
+                  <a:cs typeface="Arial" panose="020B0604020202020204" pitchFamily="34" charset="0"/>
+                </a:endParaRPr>
+              </a:p>
+            </p:txBody>
+          </p:sp>
+          <p:sp>
+            <p:nvSpPr>
+              <p:cNvPr id="71" name="Cilindro 70"/>
+              <p:cNvSpPr/>
+              <p:nvPr/>
+            </p:nvSpPr>
+            <p:spPr>
+              <a:xfrm>
+                <a:off x="3353707" y="3445775"/>
+                <a:ext cx="342900" cy="149678"/>
+              </a:xfrm>
+              <a:prstGeom prst="can">
+                <a:avLst>
+                  <a:gd name="adj" fmla="val 50000"/>
+                </a:avLst>
+              </a:prstGeom>
+            </p:spPr>
+            <p:style>
+              <a:lnRef idx="2">
+                <a:schemeClr val="accent1">
+                  <a:shade val="50000"/>
+                </a:schemeClr>
+              </a:lnRef>
+              <a:fillRef idx="1">
+                <a:schemeClr val="accent1"/>
+              </a:fillRef>
+              <a:effectRef idx="0">
+                <a:schemeClr val="accent1"/>
+              </a:effectRef>
+              <a:fontRef idx="minor">
+                <a:schemeClr val="lt1"/>
+              </a:fontRef>
+            </p:style>
+            <p:txBody>
+              <a:bodyPr rtlCol="0" anchor="ctr"/>
+              <a:lstStyle/>
+              <a:p>
+                <a:pPr algn="ctr"/>
+                <a:endParaRPr lang="pt-BR">
+                  <a:latin typeface="Arial" panose="020B0604020202020204" pitchFamily="34" charset="0"/>
+                  <a:cs typeface="Arial" panose="020B0604020202020204" pitchFamily="34" charset="0"/>
+                </a:endParaRPr>
+              </a:p>
+            </p:txBody>
+          </p:sp>
+          <p:sp>
+            <p:nvSpPr>
+              <p:cNvPr id="72" name="Cilindro 71"/>
+              <p:cNvSpPr/>
+              <p:nvPr/>
+            </p:nvSpPr>
+            <p:spPr>
+              <a:xfrm>
+                <a:off x="3633107" y="3304261"/>
+                <a:ext cx="342900" cy="149678"/>
+              </a:xfrm>
+              <a:prstGeom prst="can">
+                <a:avLst>
+                  <a:gd name="adj" fmla="val 50000"/>
+                </a:avLst>
+              </a:prstGeom>
+            </p:spPr>
+            <p:style>
+              <a:lnRef idx="2">
+                <a:schemeClr val="accent1">
+                  <a:shade val="50000"/>
+                </a:schemeClr>
+              </a:lnRef>
+              <a:fillRef idx="1">
+                <a:schemeClr val="accent1"/>
+              </a:fillRef>
+              <a:effectRef idx="0">
+                <a:schemeClr val="accent1"/>
+              </a:effectRef>
+              <a:fontRef idx="minor">
+                <a:schemeClr val="lt1"/>
+              </a:fontRef>
+            </p:style>
+            <p:txBody>
+              <a:bodyPr rtlCol="0" anchor="ctr"/>
+              <a:lstStyle/>
+              <a:p>
+                <a:pPr algn="ctr"/>
+                <a:endParaRPr lang="pt-BR">
+                  <a:latin typeface="Arial" panose="020B0604020202020204" pitchFamily="34" charset="0"/>
+                  <a:cs typeface="Arial" panose="020B0604020202020204" pitchFamily="34" charset="0"/>
+                </a:endParaRPr>
+              </a:p>
+            </p:txBody>
+          </p:sp>
+          <p:sp>
+            <p:nvSpPr>
+              <p:cNvPr id="73" name="Cilindro 72"/>
+              <p:cNvSpPr/>
+              <p:nvPr/>
+            </p:nvSpPr>
+            <p:spPr>
+              <a:xfrm>
+                <a:off x="3353707" y="3378649"/>
+                <a:ext cx="342900" cy="149678"/>
+              </a:xfrm>
+              <a:prstGeom prst="can">
+                <a:avLst>
+                  <a:gd name="adj" fmla="val 50000"/>
+                </a:avLst>
+              </a:prstGeom>
+            </p:spPr>
+            <p:style>
+              <a:lnRef idx="2">
+                <a:schemeClr val="accent1">
+                  <a:shade val="50000"/>
+                </a:schemeClr>
+              </a:lnRef>
+              <a:fillRef idx="1">
+                <a:schemeClr val="accent1"/>
+              </a:fillRef>
+              <a:effectRef idx="0">
+                <a:schemeClr val="accent1"/>
+              </a:effectRef>
+              <a:fontRef idx="minor">
+                <a:schemeClr val="lt1"/>
+              </a:fontRef>
+            </p:style>
+            <p:txBody>
+              <a:bodyPr rtlCol="0" anchor="ctr"/>
+              <a:lstStyle/>
+              <a:p>
+                <a:pPr algn="ctr"/>
+                <a:endParaRPr lang="pt-BR">
+                  <a:latin typeface="Arial" panose="020B0604020202020204" pitchFamily="34" charset="0"/>
+                  <a:cs typeface="Arial" panose="020B0604020202020204" pitchFamily="34" charset="0"/>
+                </a:endParaRPr>
+              </a:p>
+            </p:txBody>
+          </p:sp>
+          <p:sp>
+            <p:nvSpPr>
+              <p:cNvPr id="74" name="Cilindro 73"/>
+              <p:cNvSpPr/>
+              <p:nvPr/>
+            </p:nvSpPr>
+            <p:spPr>
+              <a:xfrm>
+                <a:off x="3566432" y="3565064"/>
+                <a:ext cx="342900" cy="149678"/>
+              </a:xfrm>
+              <a:prstGeom prst="can">
+                <a:avLst>
+                  <a:gd name="adj" fmla="val 50000"/>
+                </a:avLst>
+              </a:prstGeom>
+            </p:spPr>
+            <p:style>
+              <a:lnRef idx="2">
+                <a:schemeClr val="accent1">
+                  <a:shade val="50000"/>
+                </a:schemeClr>
+              </a:lnRef>
+              <a:fillRef idx="1">
+                <a:schemeClr val="accent1"/>
+              </a:fillRef>
+              <a:effectRef idx="0">
+                <a:schemeClr val="accent1"/>
+              </a:effectRef>
+              <a:fontRef idx="minor">
+                <a:schemeClr val="lt1"/>
+              </a:fontRef>
+            </p:style>
+            <p:txBody>
+              <a:bodyPr rtlCol="0" anchor="ctr"/>
+              <a:lstStyle/>
+              <a:p>
+                <a:pPr algn="ctr"/>
+                <a:endParaRPr lang="pt-BR">
+                  <a:latin typeface="Arial" panose="020B0604020202020204" pitchFamily="34" charset="0"/>
+                  <a:cs typeface="Arial" panose="020B0604020202020204" pitchFamily="34" charset="0"/>
+                </a:endParaRPr>
+              </a:p>
+            </p:txBody>
+          </p:sp>
+          <p:sp>
+            <p:nvSpPr>
+              <p:cNvPr id="75" name="Cilindro 74"/>
+              <p:cNvSpPr/>
+              <p:nvPr/>
+            </p:nvSpPr>
+            <p:spPr>
+              <a:xfrm>
+                <a:off x="3566432" y="3492261"/>
+                <a:ext cx="342900" cy="149678"/>
+              </a:xfrm>
+              <a:prstGeom prst="can">
+                <a:avLst>
+                  <a:gd name="adj" fmla="val 50000"/>
+                </a:avLst>
+              </a:prstGeom>
+            </p:spPr>
+            <p:style>
+              <a:lnRef idx="2">
+                <a:schemeClr val="accent1">
+                  <a:shade val="50000"/>
+                </a:schemeClr>
+              </a:lnRef>
+              <a:fillRef idx="1">
+                <a:schemeClr val="accent1"/>
+              </a:fillRef>
+              <a:effectRef idx="0">
+                <a:schemeClr val="accent1"/>
+              </a:effectRef>
+              <a:fontRef idx="minor">
+                <a:schemeClr val="lt1"/>
+              </a:fontRef>
+            </p:style>
+            <p:txBody>
+              <a:bodyPr rtlCol="0" anchor="ctr"/>
+              <a:lstStyle/>
+              <a:p>
+                <a:pPr algn="ctr"/>
+                <a:endParaRPr lang="pt-BR">
+                  <a:latin typeface="Arial" panose="020B0604020202020204" pitchFamily="34" charset="0"/>
+                  <a:cs typeface="Arial" panose="020B0604020202020204" pitchFamily="34" charset="0"/>
+                </a:endParaRPr>
+              </a:p>
+            </p:txBody>
+          </p:sp>
+        </p:grpSp>
+        <p:grpSp>
+          <p:nvGrpSpPr>
+            <p:cNvPr id="8" name="Agrupar 7"/>
+            <p:cNvGrpSpPr/>
+            <p:nvPr/>
+          </p:nvGrpSpPr>
+          <p:grpSpPr>
+            <a:xfrm>
+              <a:off x="4615200" y="2738725"/>
+              <a:ext cx="342900" cy="514124"/>
+              <a:chOff x="4606574" y="2781855"/>
+              <a:chExt cx="342900" cy="514124"/>
+            </a:xfrm>
+          </p:grpSpPr>
+          <p:sp>
+            <p:nvSpPr>
+              <p:cNvPr id="64" name="Cilindro 63"/>
+              <p:cNvSpPr/>
+              <p:nvPr/>
+            </p:nvSpPr>
+            <p:spPr>
+              <a:xfrm>
+                <a:off x="4606574" y="3146301"/>
+                <a:ext cx="342900" cy="149678"/>
+              </a:xfrm>
+              <a:prstGeom prst="can">
+                <a:avLst>
+                  <a:gd name="adj" fmla="val 50000"/>
+                </a:avLst>
+              </a:prstGeom>
+            </p:spPr>
+            <p:style>
+              <a:lnRef idx="2">
+                <a:schemeClr val="accent1">
+                  <a:shade val="50000"/>
+                </a:schemeClr>
+              </a:lnRef>
+              <a:fillRef idx="1">
+                <a:schemeClr val="accent1"/>
+              </a:fillRef>
+              <a:effectRef idx="0">
+                <a:schemeClr val="accent1"/>
+              </a:effectRef>
+              <a:fontRef idx="minor">
+                <a:schemeClr val="lt1"/>
+              </a:fontRef>
+            </p:style>
+            <p:txBody>
+              <a:bodyPr rtlCol="0" anchor="ctr"/>
+              <a:lstStyle/>
+              <a:p>
+                <a:pPr algn="ctr"/>
+                <a:endParaRPr lang="pt-BR">
+                  <a:latin typeface="Arial" panose="020B0604020202020204" pitchFamily="34" charset="0"/>
+                  <a:cs typeface="Arial" panose="020B0604020202020204" pitchFamily="34" charset="0"/>
+                </a:endParaRPr>
+              </a:p>
+            </p:txBody>
+          </p:sp>
+          <p:sp>
+            <p:nvSpPr>
+              <p:cNvPr id="65" name="Cilindro 64"/>
+              <p:cNvSpPr/>
+              <p:nvPr/>
+            </p:nvSpPr>
+            <p:spPr>
+              <a:xfrm>
+                <a:off x="4606574" y="3071462"/>
+                <a:ext cx="342900" cy="149678"/>
+              </a:xfrm>
+              <a:prstGeom prst="can">
+                <a:avLst>
+                  <a:gd name="adj" fmla="val 50000"/>
+                </a:avLst>
+              </a:prstGeom>
+            </p:spPr>
+            <p:style>
+              <a:lnRef idx="2">
+                <a:schemeClr val="accent1">
+                  <a:shade val="50000"/>
+                </a:schemeClr>
+              </a:lnRef>
+              <a:fillRef idx="1">
+                <a:schemeClr val="accent1"/>
+              </a:fillRef>
+              <a:effectRef idx="0">
+                <a:schemeClr val="accent1"/>
+              </a:effectRef>
+              <a:fontRef idx="minor">
+                <a:schemeClr val="lt1"/>
+              </a:fontRef>
+            </p:style>
+            <p:txBody>
+              <a:bodyPr rtlCol="0" anchor="ctr"/>
+              <a:lstStyle/>
+              <a:p>
+                <a:pPr algn="ctr"/>
+                <a:endParaRPr lang="pt-BR">
+                  <a:latin typeface="Arial" panose="020B0604020202020204" pitchFamily="34" charset="0"/>
+                  <a:cs typeface="Arial" panose="020B0604020202020204" pitchFamily="34" charset="0"/>
+                </a:endParaRPr>
+              </a:p>
+            </p:txBody>
+          </p:sp>
+          <p:sp>
+            <p:nvSpPr>
+              <p:cNvPr id="66" name="Cilindro 65"/>
+              <p:cNvSpPr/>
+              <p:nvPr/>
+            </p:nvSpPr>
+            <p:spPr>
+              <a:xfrm>
+                <a:off x="4606574" y="2996623"/>
+                <a:ext cx="342900" cy="149678"/>
+              </a:xfrm>
+              <a:prstGeom prst="can">
+                <a:avLst>
+                  <a:gd name="adj" fmla="val 50000"/>
+                </a:avLst>
+              </a:prstGeom>
+            </p:spPr>
+            <p:style>
+              <a:lnRef idx="2">
+                <a:schemeClr val="accent1">
+                  <a:shade val="50000"/>
+                </a:schemeClr>
+              </a:lnRef>
+              <a:fillRef idx="1">
+                <a:schemeClr val="accent1"/>
+              </a:fillRef>
+              <a:effectRef idx="0">
+                <a:schemeClr val="accent1"/>
+              </a:effectRef>
+              <a:fontRef idx="minor">
+                <a:schemeClr val="lt1"/>
+              </a:fontRef>
+            </p:style>
+            <p:txBody>
+              <a:bodyPr rtlCol="0" anchor="ctr"/>
+              <a:lstStyle/>
+              <a:p>
+                <a:pPr algn="ctr"/>
+                <a:endParaRPr lang="pt-BR">
+                  <a:latin typeface="Arial" panose="020B0604020202020204" pitchFamily="34" charset="0"/>
+                  <a:cs typeface="Arial" panose="020B0604020202020204" pitchFamily="34" charset="0"/>
+                </a:endParaRPr>
+              </a:p>
+            </p:txBody>
+          </p:sp>
+          <p:sp>
+            <p:nvSpPr>
+              <p:cNvPr id="67" name="Cilindro 66"/>
+              <p:cNvSpPr/>
+              <p:nvPr/>
+            </p:nvSpPr>
+            <p:spPr>
+              <a:xfrm>
+                <a:off x="4606574" y="2929497"/>
+                <a:ext cx="342900" cy="149678"/>
+              </a:xfrm>
+              <a:prstGeom prst="can">
+                <a:avLst>
+                  <a:gd name="adj" fmla="val 50000"/>
+                </a:avLst>
+              </a:prstGeom>
+            </p:spPr>
+            <p:style>
+              <a:lnRef idx="2">
+                <a:schemeClr val="accent1">
+                  <a:shade val="50000"/>
+                </a:schemeClr>
+              </a:lnRef>
+              <a:fillRef idx="1">
+                <a:schemeClr val="accent1"/>
+              </a:fillRef>
+              <a:effectRef idx="0">
+                <a:schemeClr val="accent1"/>
+              </a:effectRef>
+              <a:fontRef idx="minor">
+                <a:schemeClr val="lt1"/>
+              </a:fontRef>
+            </p:style>
+            <p:txBody>
+              <a:bodyPr rtlCol="0" anchor="ctr"/>
+              <a:lstStyle/>
+              <a:p>
+                <a:pPr algn="ctr"/>
+                <a:endParaRPr lang="pt-BR">
+                  <a:latin typeface="Arial" panose="020B0604020202020204" pitchFamily="34" charset="0"/>
+                  <a:cs typeface="Arial" panose="020B0604020202020204" pitchFamily="34" charset="0"/>
+                </a:endParaRPr>
+              </a:p>
+            </p:txBody>
+          </p:sp>
+          <p:sp>
+            <p:nvSpPr>
+              <p:cNvPr id="68" name="Cilindro 67"/>
+              <p:cNvSpPr/>
+              <p:nvPr/>
+            </p:nvSpPr>
+            <p:spPr>
+              <a:xfrm>
+                <a:off x="4606574" y="2854658"/>
+                <a:ext cx="342900" cy="149678"/>
+              </a:xfrm>
+              <a:prstGeom prst="can">
+                <a:avLst>
+                  <a:gd name="adj" fmla="val 50000"/>
+                </a:avLst>
+              </a:prstGeom>
+            </p:spPr>
+            <p:style>
+              <a:lnRef idx="2">
+                <a:schemeClr val="accent1">
+                  <a:shade val="50000"/>
+                </a:schemeClr>
+              </a:lnRef>
+              <a:fillRef idx="1">
+                <a:schemeClr val="accent1"/>
+              </a:fillRef>
+              <a:effectRef idx="0">
+                <a:schemeClr val="accent1"/>
+              </a:effectRef>
+              <a:fontRef idx="minor">
+                <a:schemeClr val="lt1"/>
+              </a:fontRef>
+            </p:style>
+            <p:txBody>
+              <a:bodyPr rtlCol="0" anchor="ctr"/>
+              <a:lstStyle/>
+              <a:p>
+                <a:pPr algn="ctr"/>
+                <a:endParaRPr lang="pt-BR">
+                  <a:latin typeface="Arial" panose="020B0604020202020204" pitchFamily="34" charset="0"/>
+                  <a:cs typeface="Arial" panose="020B0604020202020204" pitchFamily="34" charset="0"/>
+                </a:endParaRPr>
+              </a:p>
+            </p:txBody>
+          </p:sp>
+          <p:sp>
+            <p:nvSpPr>
+              <p:cNvPr id="69" name="Cilindro 68"/>
+              <p:cNvSpPr/>
+              <p:nvPr/>
+            </p:nvSpPr>
+            <p:spPr>
+              <a:xfrm>
+                <a:off x="4606574" y="2781855"/>
+                <a:ext cx="342900" cy="149678"/>
+              </a:xfrm>
+              <a:prstGeom prst="can">
+                <a:avLst>
+                  <a:gd name="adj" fmla="val 50000"/>
+                </a:avLst>
+              </a:prstGeom>
+            </p:spPr>
+            <p:style>
+              <a:lnRef idx="2">
+                <a:schemeClr val="accent1">
+                  <a:shade val="50000"/>
+                </a:schemeClr>
+              </a:lnRef>
+              <a:fillRef idx="1">
+                <a:schemeClr val="accent1"/>
+              </a:fillRef>
+              <a:effectRef idx="0">
+                <a:schemeClr val="accent1"/>
+              </a:effectRef>
+              <a:fontRef idx="minor">
+                <a:schemeClr val="lt1"/>
+              </a:fontRef>
+            </p:style>
+            <p:txBody>
+              <a:bodyPr rtlCol="0" anchor="ctr"/>
+              <a:lstStyle/>
+              <a:p>
+                <a:pPr algn="ctr"/>
+                <a:endParaRPr lang="pt-BR">
+                  <a:latin typeface="Arial" panose="020B0604020202020204" pitchFamily="34" charset="0"/>
+                  <a:cs typeface="Arial" panose="020B0604020202020204" pitchFamily="34" charset="0"/>
+                </a:endParaRPr>
+              </a:p>
+            </p:txBody>
+          </p:sp>
+        </p:grpSp>
+        <p:grpSp>
+          <p:nvGrpSpPr>
+            <p:cNvPr id="9" name="Agrupar 8"/>
+            <p:cNvGrpSpPr/>
+            <p:nvPr/>
+          </p:nvGrpSpPr>
+          <p:grpSpPr>
+            <a:xfrm>
+              <a:off x="6736341" y="1751605"/>
+              <a:ext cx="810884" cy="664955"/>
+              <a:chOff x="7082288" y="1825257"/>
+              <a:chExt cx="810884" cy="664955"/>
+            </a:xfrm>
+          </p:grpSpPr>
+          <p:sp>
+            <p:nvSpPr>
+              <p:cNvPr id="61" name="Rolagem Vertical 60"/>
+              <p:cNvSpPr/>
+              <p:nvPr/>
+            </p:nvSpPr>
+            <p:spPr>
+              <a:xfrm>
+                <a:off x="7082288" y="1825258"/>
+                <a:ext cx="405442" cy="521127"/>
+              </a:xfrm>
+              <a:prstGeom prst="verticalScroll">
+                <a:avLst/>
+              </a:prstGeom>
+              <a:solidFill>
+                <a:schemeClr val="bg2">
+                  <a:lumMod val="90000"/>
+                </a:schemeClr>
+              </a:solidFill>
+              <a:ln>
+                <a:solidFill>
+                  <a:schemeClr val="bg2">
+                    <a:lumMod val="10000"/>
+                  </a:schemeClr>
+                </a:solidFill>
+              </a:ln>
+            </p:spPr>
+            <p:style>
+              <a:lnRef idx="2">
+                <a:schemeClr val="accent1">
+                  <a:shade val="50000"/>
+                </a:schemeClr>
+              </a:lnRef>
+              <a:fillRef idx="1">
+                <a:schemeClr val="accent1"/>
+              </a:fillRef>
+              <a:effectRef idx="0">
+                <a:schemeClr val="accent1"/>
+              </a:effectRef>
+              <a:fontRef idx="minor">
+                <a:schemeClr val="lt1"/>
+              </a:fontRef>
+            </p:style>
+            <p:txBody>
+              <a:bodyPr rtlCol="0" anchor="ctr"/>
+              <a:lstStyle/>
+              <a:p>
+                <a:pPr algn="ctr"/>
+                <a:endParaRPr lang="pt-BR">
+                  <a:latin typeface="Arial" panose="020B0604020202020204" pitchFamily="34" charset="0"/>
+                  <a:cs typeface="Arial" panose="020B0604020202020204" pitchFamily="34" charset="0"/>
+                </a:endParaRPr>
+              </a:p>
+            </p:txBody>
+          </p:sp>
+          <p:sp>
+            <p:nvSpPr>
+              <p:cNvPr id="62" name="Rolagem Vertical 61"/>
+              <p:cNvSpPr/>
+              <p:nvPr/>
+            </p:nvSpPr>
+            <p:spPr>
+              <a:xfrm>
+                <a:off x="7487730" y="1825257"/>
+                <a:ext cx="405442" cy="521127"/>
+              </a:xfrm>
+              <a:prstGeom prst="verticalScroll">
+                <a:avLst/>
+              </a:prstGeom>
+              <a:solidFill>
+                <a:schemeClr val="bg2">
+                  <a:lumMod val="90000"/>
+                </a:schemeClr>
+              </a:solidFill>
+              <a:ln>
+                <a:solidFill>
+                  <a:schemeClr val="bg2">
+                    <a:lumMod val="10000"/>
+                  </a:schemeClr>
+                </a:solidFill>
+              </a:ln>
+            </p:spPr>
+            <p:style>
+              <a:lnRef idx="2">
+                <a:schemeClr val="accent1">
+                  <a:shade val="50000"/>
+                </a:schemeClr>
+              </a:lnRef>
+              <a:fillRef idx="1">
+                <a:schemeClr val="accent1"/>
+              </a:fillRef>
+              <a:effectRef idx="0">
+                <a:schemeClr val="accent1"/>
+              </a:effectRef>
+              <a:fontRef idx="minor">
+                <a:schemeClr val="lt1"/>
+              </a:fontRef>
+            </p:style>
+            <p:txBody>
+              <a:bodyPr rtlCol="0" anchor="ctr"/>
+              <a:lstStyle/>
+              <a:p>
+                <a:pPr algn="ctr"/>
+                <a:endParaRPr lang="pt-BR">
+                  <a:latin typeface="Arial" panose="020B0604020202020204" pitchFamily="34" charset="0"/>
+                  <a:cs typeface="Arial" panose="020B0604020202020204" pitchFamily="34" charset="0"/>
+                </a:endParaRPr>
+              </a:p>
+            </p:txBody>
+          </p:sp>
+          <p:sp>
+            <p:nvSpPr>
+              <p:cNvPr id="63" name="Rolagem Vertical 62"/>
+              <p:cNvSpPr/>
+              <p:nvPr/>
+            </p:nvSpPr>
+            <p:spPr>
+              <a:xfrm>
+                <a:off x="7285009" y="1969085"/>
+                <a:ext cx="405442" cy="521127"/>
+              </a:xfrm>
+              <a:prstGeom prst="verticalScroll">
+                <a:avLst/>
+              </a:prstGeom>
+              <a:solidFill>
+                <a:schemeClr val="bg2">
+                  <a:lumMod val="90000"/>
+                </a:schemeClr>
+              </a:solidFill>
+              <a:ln>
+                <a:solidFill>
+                  <a:schemeClr val="bg2">
+                    <a:lumMod val="10000"/>
+                  </a:schemeClr>
+                </a:solidFill>
+              </a:ln>
+            </p:spPr>
+            <p:style>
+              <a:lnRef idx="2">
+                <a:schemeClr val="accent1">
+                  <a:shade val="50000"/>
+                </a:schemeClr>
+              </a:lnRef>
+              <a:fillRef idx="1">
+                <a:schemeClr val="accent1"/>
+              </a:fillRef>
+              <a:effectRef idx="0">
+                <a:schemeClr val="accent1"/>
+              </a:effectRef>
+              <a:fontRef idx="minor">
+                <a:schemeClr val="lt1"/>
+              </a:fontRef>
+            </p:style>
+            <p:txBody>
+              <a:bodyPr rtlCol="0" anchor="ctr"/>
+              <a:lstStyle/>
+              <a:p>
+                <a:pPr algn="ctr"/>
+                <a:endParaRPr lang="pt-BR">
+                  <a:latin typeface="Arial" panose="020B0604020202020204" pitchFamily="34" charset="0"/>
+                  <a:cs typeface="Arial" panose="020B0604020202020204" pitchFamily="34" charset="0"/>
+                </a:endParaRPr>
+              </a:p>
+            </p:txBody>
+          </p:sp>
+        </p:grpSp>
+        <p:cxnSp>
+          <p:nvCxnSpPr>
+            <p:cNvPr id="10" name="Conector reto 9"/>
+            <p:cNvCxnSpPr>
+              <a:stCxn id="15" idx="3"/>
+            </p:cNvCxnSpPr>
+            <p:nvPr/>
+          </p:nvCxnSpPr>
+          <p:spPr>
+            <a:xfrm>
+              <a:off x="1387702" y="3577900"/>
+              <a:ext cx="411329" cy="589286"/>
+            </a:xfrm>
+            <a:prstGeom prst="line">
+              <a:avLst/>
+            </a:prstGeom>
+            <a:ln w="38100"/>
+          </p:spPr>
+          <p:style>
+            <a:lnRef idx="1">
+              <a:schemeClr val="accent1"/>
+            </a:lnRef>
+            <a:fillRef idx="0">
+              <a:schemeClr val="accent1"/>
+            </a:fillRef>
+            <a:effectRef idx="0">
+              <a:schemeClr val="accent1"/>
+            </a:effectRef>
+            <a:fontRef idx="minor">
+              <a:schemeClr val="tx1"/>
+            </a:fontRef>
+          </p:style>
+        </p:cxnSp>
+        <p:cxnSp>
+          <p:nvCxnSpPr>
+            <p:cNvPr id="11" name="Conector reto 10"/>
+            <p:cNvCxnSpPr>
+              <a:stCxn id="16" idx="3"/>
+            </p:cNvCxnSpPr>
+            <p:nvPr/>
+          </p:nvCxnSpPr>
+          <p:spPr>
+            <a:xfrm>
+              <a:off x="2735103" y="3164327"/>
+              <a:ext cx="248376" cy="543631"/>
+            </a:xfrm>
+            <a:prstGeom prst="line">
+              <a:avLst/>
+            </a:prstGeom>
+            <a:ln w="38100"/>
+          </p:spPr>
+          <p:style>
+            <a:lnRef idx="1">
+              <a:schemeClr val="accent1"/>
+            </a:lnRef>
+            <a:fillRef idx="0">
+              <a:schemeClr val="accent1"/>
+            </a:fillRef>
+            <a:effectRef idx="0">
+              <a:schemeClr val="accent1"/>
+            </a:effectRef>
+            <a:fontRef idx="minor">
+              <a:schemeClr val="tx1"/>
+            </a:fontRef>
+          </p:style>
+        </p:cxnSp>
+        <p:cxnSp>
+          <p:nvCxnSpPr>
+            <p:cNvPr id="12" name="Conector reto 11"/>
+            <p:cNvCxnSpPr>
+              <a:stCxn id="17" idx="3"/>
+            </p:cNvCxnSpPr>
+            <p:nvPr/>
+          </p:nvCxnSpPr>
+          <p:spPr>
+            <a:xfrm>
+              <a:off x="3796186" y="2686007"/>
+              <a:ext cx="425006" cy="519550"/>
+            </a:xfrm>
+            <a:prstGeom prst="line">
+              <a:avLst/>
+            </a:prstGeom>
+            <a:ln w="38100"/>
+          </p:spPr>
+          <p:style>
+            <a:lnRef idx="1">
+              <a:schemeClr val="accent1"/>
+            </a:lnRef>
+            <a:fillRef idx="0">
+              <a:schemeClr val="accent1"/>
+            </a:fillRef>
+            <a:effectRef idx="0">
+              <a:schemeClr val="accent1"/>
+            </a:effectRef>
+            <a:fontRef idx="minor">
+              <a:schemeClr val="tx1"/>
+            </a:fontRef>
+          </p:style>
+        </p:cxnSp>
+        <p:cxnSp>
+          <p:nvCxnSpPr>
+            <p:cNvPr id="13" name="Conector reto 12"/>
+            <p:cNvCxnSpPr>
+              <a:stCxn id="19" idx="3"/>
+            </p:cNvCxnSpPr>
+            <p:nvPr/>
+          </p:nvCxnSpPr>
+          <p:spPr>
+            <a:xfrm>
+              <a:off x="4978397" y="2251166"/>
+              <a:ext cx="288539" cy="593371"/>
+            </a:xfrm>
+            <a:prstGeom prst="line">
+              <a:avLst/>
+            </a:prstGeom>
+            <a:ln w="38100"/>
+          </p:spPr>
+          <p:style>
+            <a:lnRef idx="1">
+              <a:schemeClr val="accent1"/>
+            </a:lnRef>
+            <a:fillRef idx="0">
+              <a:schemeClr val="accent1"/>
+            </a:fillRef>
+            <a:effectRef idx="0">
+              <a:schemeClr val="accent1"/>
+            </a:effectRef>
+            <a:fontRef idx="minor">
+              <a:schemeClr val="tx1"/>
+            </a:fontRef>
+          </p:style>
+        </p:cxnSp>
+        <p:cxnSp>
+          <p:nvCxnSpPr>
+            <p:cNvPr id="14" name="Conector reto 13"/>
+            <p:cNvCxnSpPr>
+              <a:stCxn id="18" idx="3"/>
+            </p:cNvCxnSpPr>
+            <p:nvPr/>
+          </p:nvCxnSpPr>
+          <p:spPr>
+            <a:xfrm>
+              <a:off x="6096000" y="1816012"/>
+              <a:ext cx="368300" cy="641820"/>
+            </a:xfrm>
+            <a:prstGeom prst="line">
+              <a:avLst/>
+            </a:prstGeom>
+            <a:ln w="38100"/>
+          </p:spPr>
+          <p:style>
+            <a:lnRef idx="1">
+              <a:schemeClr val="accent1"/>
+            </a:lnRef>
+            <a:fillRef idx="0">
+              <a:schemeClr val="accent1"/>
+            </a:fillRef>
+            <a:effectRef idx="0">
+              <a:schemeClr val="accent1"/>
+            </a:effectRef>
+            <a:fontRef idx="minor">
+              <a:schemeClr val="tx1"/>
+            </a:fontRef>
+          </p:style>
+        </p:cxnSp>
+        <p:sp>
+          <p:nvSpPr>
+            <p:cNvPr id="15" name="Retângulo 14"/>
+            <p:cNvSpPr/>
+            <p:nvPr/>
+          </p:nvSpPr>
+          <p:spPr>
+            <a:xfrm>
+              <a:off x="595223" y="3464758"/>
+              <a:ext cx="792479" cy="226284"/>
+            </a:xfrm>
+            <a:prstGeom prst="rect">
+              <a:avLst/>
+            </a:prstGeom>
+            <a:solidFill>
+              <a:schemeClr val="bg2">
+                <a:lumMod val="90000"/>
+              </a:schemeClr>
+            </a:solidFill>
+            <a:ln>
+              <a:noFill/>
+            </a:ln>
+          </p:spPr>
+          <p:style>
+            <a:lnRef idx="2">
+              <a:schemeClr val="accent1">
+                <a:shade val="50000"/>
+              </a:schemeClr>
+            </a:lnRef>
+            <a:fillRef idx="1">
+              <a:schemeClr val="accent1"/>
+            </a:fillRef>
+            <a:effectRef idx="0">
+              <a:schemeClr val="accent1"/>
+            </a:effectRef>
+            <a:fontRef idx="minor">
+              <a:schemeClr val="lt1"/>
+            </a:fontRef>
+          </p:style>
+          <p:txBody>
+            <a:bodyPr rtlCol="0" anchor="ctr"/>
+            <a:lstStyle/>
+            <a:p>
+              <a:pPr algn="ctr"/>
+              <a:r>
+                <a:rPr lang="pt-BR" dirty="0" smtClean="0">
+                  <a:solidFill>
+                    <a:schemeClr val="bg2">
+                      <a:lumMod val="10000"/>
+                    </a:schemeClr>
+                  </a:solidFill>
+                  <a:latin typeface="Arial" panose="020B0604020202020204" pitchFamily="34" charset="0"/>
+                  <a:cs typeface="Arial" panose="020B0604020202020204" pitchFamily="34" charset="0"/>
+                </a:rPr>
+                <a:t>Seleção</a:t>
+              </a:r>
+              <a:endParaRPr lang="pt-BR" dirty="0">
+                <a:solidFill>
+                  <a:schemeClr val="bg2">
+                    <a:lumMod val="10000"/>
+                  </a:schemeClr>
+                </a:solidFill>
+                <a:latin typeface="Arial" panose="020B0604020202020204" pitchFamily="34" charset="0"/>
+                <a:cs typeface="Arial" panose="020B0604020202020204" pitchFamily="34" charset="0"/>
+              </a:endParaRPr>
+            </a:p>
+          </p:txBody>
+        </p:sp>
+        <p:sp>
+          <p:nvSpPr>
+            <p:cNvPr id="16" name="Retângulo 15"/>
+            <p:cNvSpPr/>
+            <p:nvPr/>
+          </p:nvSpPr>
+          <p:spPr>
+            <a:xfrm>
+              <a:off x="1219201" y="3062672"/>
+              <a:ext cx="1515902" cy="203309"/>
+            </a:xfrm>
+            <a:prstGeom prst="rect">
+              <a:avLst/>
+            </a:prstGeom>
+            <a:solidFill>
+              <a:schemeClr val="bg2">
+                <a:lumMod val="90000"/>
+              </a:schemeClr>
+            </a:solidFill>
+            <a:ln>
+              <a:noFill/>
+            </a:ln>
+          </p:spPr>
+          <p:style>
+            <a:lnRef idx="2">
+              <a:schemeClr val="accent1">
+                <a:shade val="50000"/>
+              </a:schemeClr>
+            </a:lnRef>
+            <a:fillRef idx="1">
+              <a:schemeClr val="accent1"/>
+            </a:fillRef>
+            <a:effectRef idx="0">
+              <a:schemeClr val="accent1"/>
+            </a:effectRef>
+            <a:fontRef idx="minor">
+              <a:schemeClr val="lt1"/>
+            </a:fontRef>
+          </p:style>
+          <p:txBody>
+            <a:bodyPr rtlCol="0" anchor="ctr"/>
+            <a:lstStyle/>
+            <a:p>
+              <a:pPr algn="ctr"/>
+              <a:r>
+                <a:rPr lang="pt-BR" dirty="0" smtClean="0">
+                  <a:solidFill>
+                    <a:schemeClr val="bg2">
+                      <a:lumMod val="10000"/>
+                    </a:schemeClr>
+                  </a:solidFill>
+                  <a:latin typeface="Arial" panose="020B0604020202020204" pitchFamily="34" charset="0"/>
+                  <a:cs typeface="Arial" panose="020B0604020202020204" pitchFamily="34" charset="0"/>
+                </a:rPr>
+                <a:t>Pré-processamento</a:t>
+              </a:r>
+              <a:endParaRPr lang="pt-BR" dirty="0">
+                <a:solidFill>
+                  <a:schemeClr val="bg2">
+                    <a:lumMod val="10000"/>
+                  </a:schemeClr>
+                </a:solidFill>
+                <a:latin typeface="Arial" panose="020B0604020202020204" pitchFamily="34" charset="0"/>
+                <a:cs typeface="Arial" panose="020B0604020202020204" pitchFamily="34" charset="0"/>
+              </a:endParaRPr>
+            </a:p>
+          </p:txBody>
+        </p:sp>
+        <p:sp>
+          <p:nvSpPr>
+            <p:cNvPr id="17" name="Retângulo 16"/>
+            <p:cNvSpPr/>
+            <p:nvPr/>
+          </p:nvSpPr>
+          <p:spPr>
+            <a:xfrm>
+              <a:off x="2540794" y="2584352"/>
+              <a:ext cx="1255392" cy="203309"/>
+            </a:xfrm>
+            <a:prstGeom prst="rect">
+              <a:avLst/>
+            </a:prstGeom>
+            <a:solidFill>
+              <a:schemeClr val="bg2">
+                <a:lumMod val="90000"/>
+              </a:schemeClr>
+            </a:solidFill>
+            <a:ln>
+              <a:noFill/>
+            </a:ln>
+          </p:spPr>
+          <p:style>
+            <a:lnRef idx="2">
+              <a:schemeClr val="accent1">
+                <a:shade val="50000"/>
+              </a:schemeClr>
+            </a:lnRef>
+            <a:fillRef idx="1">
+              <a:schemeClr val="accent1"/>
+            </a:fillRef>
+            <a:effectRef idx="0">
+              <a:schemeClr val="accent1"/>
+            </a:effectRef>
+            <a:fontRef idx="minor">
+              <a:schemeClr val="lt1"/>
+            </a:fontRef>
+          </p:style>
+          <p:txBody>
+            <a:bodyPr rtlCol="0" anchor="ctr"/>
+            <a:lstStyle/>
+            <a:p>
+              <a:pPr algn="ctr"/>
+              <a:r>
+                <a:rPr lang="pt-BR" dirty="0" smtClean="0">
+                  <a:solidFill>
+                    <a:schemeClr val="bg2">
+                      <a:lumMod val="10000"/>
+                    </a:schemeClr>
+                  </a:solidFill>
+                  <a:latin typeface="Arial" panose="020B0604020202020204" pitchFamily="34" charset="0"/>
+                  <a:cs typeface="Arial" panose="020B0604020202020204" pitchFamily="34" charset="0"/>
+                </a:rPr>
+                <a:t>Transformação</a:t>
+              </a:r>
+              <a:endParaRPr lang="pt-BR" dirty="0">
+                <a:solidFill>
+                  <a:schemeClr val="bg2">
+                    <a:lumMod val="10000"/>
+                  </a:schemeClr>
+                </a:solidFill>
+                <a:latin typeface="Arial" panose="020B0604020202020204" pitchFamily="34" charset="0"/>
+                <a:cs typeface="Arial" panose="020B0604020202020204" pitchFamily="34" charset="0"/>
+              </a:endParaRPr>
+            </a:p>
+          </p:txBody>
+        </p:sp>
+        <p:sp>
+          <p:nvSpPr>
+            <p:cNvPr id="18" name="Retângulo 17"/>
+            <p:cNvSpPr/>
+            <p:nvPr/>
+          </p:nvSpPr>
+          <p:spPr>
+            <a:xfrm>
+              <a:off x="4191630" y="1714415"/>
+              <a:ext cx="1904370" cy="203194"/>
+            </a:xfrm>
+            <a:prstGeom prst="rect">
+              <a:avLst/>
+            </a:prstGeom>
+            <a:solidFill>
+              <a:schemeClr val="bg2">
+                <a:lumMod val="90000"/>
+              </a:schemeClr>
+            </a:solidFill>
+            <a:ln>
+              <a:noFill/>
+            </a:ln>
+          </p:spPr>
+          <p:style>
+            <a:lnRef idx="2">
+              <a:schemeClr val="accent1">
+                <a:shade val="50000"/>
+              </a:schemeClr>
+            </a:lnRef>
+            <a:fillRef idx="1">
+              <a:schemeClr val="accent1"/>
+            </a:fillRef>
+            <a:effectRef idx="0">
+              <a:schemeClr val="accent1"/>
+            </a:effectRef>
+            <a:fontRef idx="minor">
+              <a:schemeClr val="lt1"/>
+            </a:fontRef>
+          </p:style>
+          <p:txBody>
+            <a:bodyPr rtlCol="0" anchor="ctr"/>
+            <a:lstStyle/>
+            <a:p>
+              <a:pPr algn="ctr"/>
+              <a:r>
+                <a:rPr lang="pt-BR" dirty="0" smtClean="0">
+                  <a:solidFill>
+                    <a:schemeClr val="bg2">
+                      <a:lumMod val="10000"/>
+                    </a:schemeClr>
+                  </a:solidFill>
+                  <a:latin typeface="Arial" panose="020B0604020202020204" pitchFamily="34" charset="0"/>
+                  <a:cs typeface="Arial" panose="020B0604020202020204" pitchFamily="34" charset="0"/>
+                </a:rPr>
+                <a:t>Interpretação e avaliação</a:t>
+              </a:r>
+              <a:endParaRPr lang="pt-BR" dirty="0">
+                <a:solidFill>
+                  <a:schemeClr val="bg2">
+                    <a:lumMod val="10000"/>
+                  </a:schemeClr>
+                </a:solidFill>
+                <a:latin typeface="Arial" panose="020B0604020202020204" pitchFamily="34" charset="0"/>
+                <a:cs typeface="Arial" panose="020B0604020202020204" pitchFamily="34" charset="0"/>
+              </a:endParaRPr>
+            </a:p>
+          </p:txBody>
+        </p:sp>
+        <p:sp>
+          <p:nvSpPr>
+            <p:cNvPr id="19" name="Retângulo 18"/>
+            <p:cNvSpPr/>
+            <p:nvPr/>
+          </p:nvSpPr>
+          <p:spPr>
+            <a:xfrm>
+              <a:off x="3398044" y="2149569"/>
+              <a:ext cx="1580353" cy="203194"/>
+            </a:xfrm>
+            <a:prstGeom prst="rect">
+              <a:avLst/>
+            </a:prstGeom>
+            <a:solidFill>
+              <a:schemeClr val="bg2">
+                <a:lumMod val="90000"/>
+              </a:schemeClr>
+            </a:solidFill>
+            <a:ln>
+              <a:noFill/>
+            </a:ln>
+          </p:spPr>
+          <p:style>
+            <a:lnRef idx="2">
+              <a:schemeClr val="accent1">
+                <a:shade val="50000"/>
+              </a:schemeClr>
+            </a:lnRef>
+            <a:fillRef idx="1">
+              <a:schemeClr val="accent1"/>
+            </a:fillRef>
+            <a:effectRef idx="0">
+              <a:schemeClr val="accent1"/>
+            </a:effectRef>
+            <a:fontRef idx="minor">
+              <a:schemeClr val="lt1"/>
+            </a:fontRef>
+          </p:style>
+          <p:txBody>
+            <a:bodyPr rtlCol="0" anchor="ctr"/>
+            <a:lstStyle/>
+            <a:p>
+              <a:pPr algn="ctr"/>
+              <a:r>
+                <a:rPr lang="pt-BR" dirty="0" smtClean="0">
+                  <a:solidFill>
+                    <a:schemeClr val="bg2">
+                      <a:lumMod val="10000"/>
+                    </a:schemeClr>
+                  </a:solidFill>
+                  <a:latin typeface="Arial" panose="020B0604020202020204" pitchFamily="34" charset="0"/>
+                  <a:cs typeface="Arial" panose="020B0604020202020204" pitchFamily="34" charset="0"/>
+                </a:rPr>
+                <a:t>Mineração de dados</a:t>
+              </a:r>
+              <a:endParaRPr lang="pt-BR" dirty="0">
+                <a:solidFill>
+                  <a:schemeClr val="bg2">
+                    <a:lumMod val="10000"/>
+                  </a:schemeClr>
+                </a:solidFill>
+                <a:latin typeface="Arial" panose="020B0604020202020204" pitchFamily="34" charset="0"/>
+                <a:cs typeface="Arial" panose="020B0604020202020204" pitchFamily="34" charset="0"/>
+              </a:endParaRPr>
+            </a:p>
+          </p:txBody>
+        </p:sp>
+        <p:cxnSp>
+          <p:nvCxnSpPr>
+            <p:cNvPr id="20" name="Conector de Seta Reta 19"/>
+            <p:cNvCxnSpPr/>
+            <p:nvPr/>
+          </p:nvCxnSpPr>
+          <p:spPr>
+            <a:xfrm flipV="1">
+              <a:off x="2795635" y="3586348"/>
+              <a:ext cx="482771" cy="187780"/>
+            </a:xfrm>
+            <a:prstGeom prst="straightConnector1">
+              <a:avLst/>
+            </a:prstGeom>
+            <a:ln w="38100">
+              <a:solidFill>
+                <a:schemeClr val="bg2">
+                  <a:lumMod val="10000"/>
+                </a:schemeClr>
+              </a:solidFill>
+              <a:prstDash val="sysDash"/>
+              <a:tailEnd type="triangle"/>
+            </a:ln>
+          </p:spPr>
+          <p:style>
+            <a:lnRef idx="1">
+              <a:schemeClr val="accent1"/>
+            </a:lnRef>
+            <a:fillRef idx="0">
+              <a:schemeClr val="accent1"/>
+            </a:fillRef>
+            <a:effectRef idx="0">
+              <a:schemeClr val="accent1"/>
+            </a:effectRef>
+            <a:fontRef idx="minor">
+              <a:schemeClr val="tx1"/>
+            </a:fontRef>
+          </p:style>
+        </p:cxnSp>
+        <p:cxnSp>
+          <p:nvCxnSpPr>
+            <p:cNvPr id="21" name="Conector de Seta Reta 20"/>
+            <p:cNvCxnSpPr/>
+            <p:nvPr/>
+          </p:nvCxnSpPr>
+          <p:spPr>
+            <a:xfrm flipV="1">
+              <a:off x="4031273" y="3101372"/>
+              <a:ext cx="482771" cy="187780"/>
+            </a:xfrm>
+            <a:prstGeom prst="straightConnector1">
+              <a:avLst/>
+            </a:prstGeom>
+            <a:ln w="38100">
+              <a:solidFill>
+                <a:schemeClr val="bg2">
+                  <a:lumMod val="10000"/>
+                </a:schemeClr>
+              </a:solidFill>
+              <a:prstDash val="sysDash"/>
+              <a:tailEnd type="triangle"/>
+            </a:ln>
+          </p:spPr>
+          <p:style>
+            <a:lnRef idx="1">
+              <a:schemeClr val="accent1"/>
+            </a:lnRef>
+            <a:fillRef idx="0">
+              <a:schemeClr val="accent1"/>
+            </a:fillRef>
+            <a:effectRef idx="0">
+              <a:schemeClr val="accent1"/>
+            </a:effectRef>
+            <a:fontRef idx="minor">
+              <a:schemeClr val="tx1"/>
+            </a:fontRef>
+          </p:style>
+        </p:cxnSp>
+        <p:cxnSp>
+          <p:nvCxnSpPr>
+            <p:cNvPr id="22" name="Conector de Seta Reta 21"/>
+            <p:cNvCxnSpPr/>
+            <p:nvPr/>
+          </p:nvCxnSpPr>
+          <p:spPr>
+            <a:xfrm flipV="1">
+              <a:off x="5078954" y="2736659"/>
+              <a:ext cx="482771" cy="187780"/>
+            </a:xfrm>
+            <a:prstGeom prst="straightConnector1">
+              <a:avLst/>
+            </a:prstGeom>
+            <a:ln w="38100">
+              <a:solidFill>
+                <a:schemeClr val="bg2">
+                  <a:lumMod val="10000"/>
+                </a:schemeClr>
+              </a:solidFill>
+              <a:prstDash val="sysDash"/>
+              <a:tailEnd type="triangle"/>
+            </a:ln>
+          </p:spPr>
+          <p:style>
+            <a:lnRef idx="1">
+              <a:schemeClr val="accent1"/>
+            </a:lnRef>
+            <a:fillRef idx="0">
+              <a:schemeClr val="accent1"/>
+            </a:fillRef>
+            <a:effectRef idx="0">
+              <a:schemeClr val="accent1"/>
+            </a:effectRef>
+            <a:fontRef idx="minor">
+              <a:schemeClr val="tx1"/>
+            </a:fontRef>
+          </p:style>
+        </p:cxnSp>
+        <p:cxnSp>
+          <p:nvCxnSpPr>
+            <p:cNvPr id="23" name="Conector de Seta Reta 22"/>
+            <p:cNvCxnSpPr/>
+            <p:nvPr/>
+          </p:nvCxnSpPr>
+          <p:spPr>
+            <a:xfrm flipV="1">
+              <a:off x="6275830" y="2350742"/>
+              <a:ext cx="482771" cy="187780"/>
+            </a:xfrm>
+            <a:prstGeom prst="straightConnector1">
+              <a:avLst/>
+            </a:prstGeom>
+            <a:ln w="38100">
+              <a:solidFill>
+                <a:schemeClr val="bg2">
+                  <a:lumMod val="10000"/>
+                </a:schemeClr>
+              </a:solidFill>
+              <a:prstDash val="sysDash"/>
+              <a:tailEnd type="triangle"/>
+            </a:ln>
+          </p:spPr>
+          <p:style>
+            <a:lnRef idx="1">
+              <a:schemeClr val="accent1"/>
+            </a:lnRef>
+            <a:fillRef idx="0">
+              <a:schemeClr val="accent1"/>
+            </a:fillRef>
+            <a:effectRef idx="0">
+              <a:schemeClr val="accent1"/>
+            </a:effectRef>
+            <a:fontRef idx="minor">
+              <a:schemeClr val="tx1"/>
+            </a:fontRef>
+          </p:style>
+        </p:cxnSp>
+        <p:cxnSp>
+          <p:nvCxnSpPr>
+            <p:cNvPr id="24" name="Conector Angulado 23"/>
+            <p:cNvCxnSpPr/>
+            <p:nvPr/>
+          </p:nvCxnSpPr>
+          <p:spPr>
+            <a:xfrm rot="10800000" flipV="1">
+              <a:off x="1863312" y="2466256"/>
+              <a:ext cx="4600988" cy="2228875"/>
+            </a:xfrm>
+            <a:prstGeom prst="bentConnector3">
+              <a:avLst>
+                <a:gd name="adj1" fmla="val -375"/>
+              </a:avLst>
+            </a:prstGeom>
+            <a:ln w="38100">
+              <a:solidFill>
+                <a:schemeClr val="bg2">
+                  <a:lumMod val="10000"/>
+                </a:schemeClr>
+              </a:solidFill>
+              <a:prstDash val="sysDash"/>
+            </a:ln>
+          </p:spPr>
+          <p:style>
+            <a:lnRef idx="1">
+              <a:schemeClr val="accent1"/>
+            </a:lnRef>
+            <a:fillRef idx="0">
+              <a:schemeClr val="accent1"/>
+            </a:fillRef>
+            <a:effectRef idx="0">
+              <a:schemeClr val="accent1"/>
+            </a:effectRef>
+            <a:fontRef idx="minor">
+              <a:schemeClr val="tx1"/>
+            </a:fontRef>
+          </p:style>
+        </p:cxnSp>
+        <p:cxnSp>
+          <p:nvCxnSpPr>
+            <p:cNvPr id="25" name="Conector de Seta Reta 24"/>
+            <p:cNvCxnSpPr/>
+            <p:nvPr/>
+          </p:nvCxnSpPr>
+          <p:spPr>
+            <a:xfrm flipV="1">
+              <a:off x="1863306" y="4205288"/>
+              <a:ext cx="0" cy="489848"/>
+            </a:xfrm>
+            <a:prstGeom prst="straightConnector1">
+              <a:avLst/>
+            </a:prstGeom>
+            <a:ln w="38100">
+              <a:solidFill>
+                <a:schemeClr val="bg2">
+                  <a:lumMod val="10000"/>
+                </a:schemeClr>
+              </a:solidFill>
+              <a:prstDash val="sysDash"/>
+              <a:tailEnd type="triangle"/>
+            </a:ln>
+          </p:spPr>
+          <p:style>
+            <a:lnRef idx="1">
+              <a:schemeClr val="accent1"/>
+            </a:lnRef>
+            <a:fillRef idx="0">
+              <a:schemeClr val="accent1"/>
+            </a:fillRef>
+            <a:effectRef idx="0">
+              <a:schemeClr val="accent1"/>
+            </a:effectRef>
+            <a:fontRef idx="minor">
+              <a:schemeClr val="tx1"/>
+            </a:fontRef>
+          </p:style>
+        </p:cxnSp>
+        <p:cxnSp>
+          <p:nvCxnSpPr>
+            <p:cNvPr id="26" name="Conector de Seta Reta 25"/>
+            <p:cNvCxnSpPr/>
+            <p:nvPr/>
+          </p:nvCxnSpPr>
+          <p:spPr>
+            <a:xfrm flipH="1" flipV="1">
+              <a:off x="2970715" y="3774128"/>
+              <a:ext cx="1" cy="921008"/>
+            </a:xfrm>
+            <a:prstGeom prst="straightConnector1">
+              <a:avLst/>
+            </a:prstGeom>
+            <a:ln w="38100">
+              <a:solidFill>
+                <a:schemeClr val="bg2">
+                  <a:lumMod val="10000"/>
+                </a:schemeClr>
+              </a:solidFill>
+              <a:prstDash val="sysDash"/>
+              <a:tailEnd type="triangle"/>
+            </a:ln>
+          </p:spPr>
+          <p:style>
+            <a:lnRef idx="1">
+              <a:schemeClr val="accent1"/>
+            </a:lnRef>
+            <a:fillRef idx="0">
+              <a:schemeClr val="accent1"/>
+            </a:fillRef>
+            <a:effectRef idx="0">
+              <a:schemeClr val="accent1"/>
+            </a:effectRef>
+            <a:fontRef idx="minor">
+              <a:schemeClr val="tx1"/>
+            </a:fontRef>
+          </p:style>
+        </p:cxnSp>
+        <p:cxnSp>
+          <p:nvCxnSpPr>
+            <p:cNvPr id="27" name="Conector de Seta Reta 26"/>
+            <p:cNvCxnSpPr/>
+            <p:nvPr/>
+          </p:nvCxnSpPr>
+          <p:spPr>
+            <a:xfrm flipV="1">
+              <a:off x="1597761" y="4050784"/>
+              <a:ext cx="482771" cy="187780"/>
+            </a:xfrm>
+            <a:prstGeom prst="straightConnector1">
+              <a:avLst/>
+            </a:prstGeom>
+            <a:ln w="38100">
+              <a:solidFill>
+                <a:schemeClr val="bg2">
+                  <a:lumMod val="10000"/>
+                </a:schemeClr>
+              </a:solidFill>
+              <a:prstDash val="sysDash"/>
+              <a:tailEnd type="triangle"/>
+            </a:ln>
+          </p:spPr>
+          <p:style>
+            <a:lnRef idx="1">
+              <a:schemeClr val="accent1"/>
+            </a:lnRef>
+            <a:fillRef idx="0">
+              <a:schemeClr val="accent1"/>
+            </a:fillRef>
+            <a:effectRef idx="0">
+              <a:schemeClr val="accent1"/>
+            </a:effectRef>
+            <a:fontRef idx="minor">
+              <a:schemeClr val="tx1"/>
+            </a:fontRef>
+          </p:style>
+        </p:cxnSp>
+        <p:cxnSp>
+          <p:nvCxnSpPr>
+            <p:cNvPr id="28" name="Conector de Seta Reta 27"/>
+            <p:cNvCxnSpPr/>
+            <p:nvPr/>
+          </p:nvCxnSpPr>
+          <p:spPr>
+            <a:xfrm flipV="1">
+              <a:off x="4268819" y="3276600"/>
+              <a:ext cx="0" cy="1418536"/>
+            </a:xfrm>
+            <a:prstGeom prst="straightConnector1">
+              <a:avLst/>
+            </a:prstGeom>
+            <a:ln w="38100">
+              <a:solidFill>
+                <a:schemeClr val="bg2">
+                  <a:lumMod val="10000"/>
+                </a:schemeClr>
+              </a:solidFill>
+              <a:prstDash val="sysDash"/>
+              <a:tailEnd type="triangle"/>
+            </a:ln>
+          </p:spPr>
+          <p:style>
+            <a:lnRef idx="1">
+              <a:schemeClr val="accent1"/>
+            </a:lnRef>
+            <a:fillRef idx="0">
+              <a:schemeClr val="accent1"/>
+            </a:fillRef>
+            <a:effectRef idx="0">
+              <a:schemeClr val="accent1"/>
+            </a:effectRef>
+            <a:fontRef idx="minor">
+              <a:schemeClr val="tx1"/>
+            </a:fontRef>
+          </p:style>
+        </p:cxnSp>
+        <p:cxnSp>
+          <p:nvCxnSpPr>
+            <p:cNvPr id="29" name="Conector de Seta Reta 28"/>
+            <p:cNvCxnSpPr/>
+            <p:nvPr/>
+          </p:nvCxnSpPr>
+          <p:spPr>
+            <a:xfrm flipV="1">
+              <a:off x="5328043" y="2900624"/>
+              <a:ext cx="0" cy="1780223"/>
+            </a:xfrm>
+            <a:prstGeom prst="straightConnector1">
+              <a:avLst/>
+            </a:prstGeom>
+            <a:ln w="38100">
+              <a:solidFill>
+                <a:schemeClr val="bg2">
+                  <a:lumMod val="10000"/>
+                </a:schemeClr>
+              </a:solidFill>
+              <a:prstDash val="sysDash"/>
+              <a:tailEnd type="triangle"/>
+            </a:ln>
+          </p:spPr>
+          <p:style>
+            <a:lnRef idx="1">
+              <a:schemeClr val="accent1"/>
+            </a:lnRef>
+            <a:fillRef idx="0">
+              <a:schemeClr val="accent1"/>
+            </a:fillRef>
+            <a:effectRef idx="0">
+              <a:schemeClr val="accent1"/>
+            </a:effectRef>
+            <a:fontRef idx="minor">
+              <a:schemeClr val="tx1"/>
+            </a:fontRef>
+          </p:style>
+        </p:cxnSp>
+        <p:sp>
+          <p:nvSpPr>
+            <p:cNvPr id="30" name="CaixaDeTexto 29"/>
+            <p:cNvSpPr txBox="1"/>
+            <p:nvPr/>
+          </p:nvSpPr>
+          <p:spPr>
+            <a:xfrm>
+              <a:off x="661296" y="4618132"/>
+              <a:ext cx="874513" cy="190581"/>
+            </a:xfrm>
+            <a:prstGeom prst="rect">
+              <a:avLst/>
+            </a:prstGeom>
+            <a:noFill/>
+          </p:spPr>
+          <p:txBody>
+            <a:bodyPr wrap="square" rtlCol="0">
+              <a:spAutoFit/>
+            </a:bodyPr>
+            <a:lstStyle/>
+            <a:p>
+              <a:pPr algn="ctr"/>
+              <a:r>
+                <a:rPr lang="pt-BR" dirty="0">
+                  <a:latin typeface="Arial" panose="020B0604020202020204" pitchFamily="34" charset="0"/>
+                  <a:cs typeface="Arial" panose="020B0604020202020204" pitchFamily="34" charset="0"/>
+                </a:rPr>
+                <a:t>D</a:t>
+              </a:r>
+              <a:r>
+                <a:rPr lang="pt-BR" dirty="0" smtClean="0">
+                  <a:latin typeface="Arial" panose="020B0604020202020204" pitchFamily="34" charset="0"/>
+                  <a:cs typeface="Arial" panose="020B0604020202020204" pitchFamily="34" charset="0"/>
+                </a:rPr>
+                <a:t>ados</a:t>
+              </a:r>
+              <a:endParaRPr lang="pt-BR" dirty="0">
+                <a:latin typeface="Arial" panose="020B0604020202020204" pitchFamily="34" charset="0"/>
+                <a:cs typeface="Arial" panose="020B0604020202020204" pitchFamily="34" charset="0"/>
+              </a:endParaRPr>
+            </a:p>
+          </p:txBody>
+        </p:sp>
+        <p:sp>
+          <p:nvSpPr>
+            <p:cNvPr id="31" name="CaixaDeTexto 30"/>
+            <p:cNvSpPr txBox="1"/>
+            <p:nvPr/>
+          </p:nvSpPr>
+          <p:spPr>
+            <a:xfrm>
+              <a:off x="1902349" y="4091899"/>
+              <a:ext cx="1120969" cy="333516"/>
+            </a:xfrm>
+            <a:prstGeom prst="rect">
+              <a:avLst/>
+            </a:prstGeom>
+            <a:noFill/>
+          </p:spPr>
+          <p:txBody>
+            <a:bodyPr wrap="square" rtlCol="0">
+              <a:spAutoFit/>
+            </a:bodyPr>
+            <a:lstStyle/>
+            <a:p>
+              <a:pPr algn="ctr"/>
+              <a:r>
+                <a:rPr lang="pt-BR" dirty="0" smtClean="0">
+                  <a:latin typeface="Arial" panose="020B0604020202020204" pitchFamily="34" charset="0"/>
+                  <a:cs typeface="Arial" panose="020B0604020202020204" pitchFamily="34" charset="0"/>
+                </a:rPr>
+                <a:t>Dados selecionados</a:t>
+              </a:r>
+              <a:endParaRPr lang="pt-BR" dirty="0">
+                <a:latin typeface="Arial" panose="020B0604020202020204" pitchFamily="34" charset="0"/>
+                <a:cs typeface="Arial" panose="020B0604020202020204" pitchFamily="34" charset="0"/>
+              </a:endParaRPr>
+            </a:p>
+          </p:txBody>
+        </p:sp>
+        <p:sp>
+          <p:nvSpPr>
+            <p:cNvPr id="32" name="CaixaDeTexto 31"/>
+            <p:cNvSpPr txBox="1"/>
+            <p:nvPr/>
+          </p:nvSpPr>
+          <p:spPr>
+            <a:xfrm>
+              <a:off x="2962994" y="3636011"/>
+              <a:ext cx="1318523" cy="333516"/>
+            </a:xfrm>
+            <a:prstGeom prst="rect">
+              <a:avLst/>
+            </a:prstGeom>
+            <a:noFill/>
+          </p:spPr>
+          <p:txBody>
+            <a:bodyPr wrap="square" rtlCol="0">
+              <a:spAutoFit/>
+            </a:bodyPr>
+            <a:lstStyle/>
+            <a:p>
+              <a:pPr algn="ctr"/>
+              <a:r>
+                <a:rPr lang="pt-BR" dirty="0" smtClean="0">
+                  <a:latin typeface="Arial" panose="020B0604020202020204" pitchFamily="34" charset="0"/>
+                  <a:cs typeface="Arial" panose="020B0604020202020204" pitchFamily="34" charset="0"/>
+                </a:rPr>
+                <a:t>Dados </a:t>
+              </a:r>
+            </a:p>
+            <a:p>
+              <a:pPr algn="ctr"/>
+              <a:r>
+                <a:rPr lang="pt-BR" dirty="0" err="1" smtClean="0">
+                  <a:latin typeface="Arial" panose="020B0604020202020204" pitchFamily="34" charset="0"/>
+                  <a:cs typeface="Arial" panose="020B0604020202020204" pitchFamily="34" charset="0"/>
+                </a:rPr>
+                <a:t>pré</a:t>
+              </a:r>
+              <a:r>
+                <a:rPr lang="pt-BR" dirty="0" smtClean="0">
+                  <a:latin typeface="Arial" panose="020B0604020202020204" pitchFamily="34" charset="0"/>
+                  <a:cs typeface="Arial" panose="020B0604020202020204" pitchFamily="34" charset="0"/>
+                </a:rPr>
+                <a:t>-processados</a:t>
+              </a:r>
+              <a:endParaRPr lang="pt-BR" dirty="0">
+                <a:latin typeface="Arial" panose="020B0604020202020204" pitchFamily="34" charset="0"/>
+                <a:cs typeface="Arial" panose="020B0604020202020204" pitchFamily="34" charset="0"/>
+              </a:endParaRPr>
+            </a:p>
+          </p:txBody>
+        </p:sp>
+        <p:sp>
+          <p:nvSpPr>
+            <p:cNvPr id="33" name="CaixaDeTexto 32"/>
+            <p:cNvSpPr txBox="1"/>
+            <p:nvPr/>
+          </p:nvSpPr>
+          <p:spPr>
+            <a:xfrm>
+              <a:off x="4160518" y="3259447"/>
+              <a:ext cx="1318523" cy="333516"/>
+            </a:xfrm>
+            <a:prstGeom prst="rect">
+              <a:avLst/>
+            </a:prstGeom>
+            <a:noFill/>
+          </p:spPr>
+          <p:txBody>
+            <a:bodyPr wrap="square" rtlCol="0">
+              <a:spAutoFit/>
+            </a:bodyPr>
+            <a:lstStyle/>
+            <a:p>
+              <a:pPr algn="ctr"/>
+              <a:r>
+                <a:rPr lang="pt-BR" dirty="0" smtClean="0">
+                  <a:latin typeface="Arial" panose="020B0604020202020204" pitchFamily="34" charset="0"/>
+                  <a:cs typeface="Arial" panose="020B0604020202020204" pitchFamily="34" charset="0"/>
+                </a:rPr>
+                <a:t>Dados </a:t>
+              </a:r>
+            </a:p>
+            <a:p>
+              <a:pPr algn="ctr"/>
+              <a:r>
+                <a:rPr lang="pt-BR" dirty="0" smtClean="0">
+                  <a:latin typeface="Arial" panose="020B0604020202020204" pitchFamily="34" charset="0"/>
+                  <a:cs typeface="Arial" panose="020B0604020202020204" pitchFamily="34" charset="0"/>
+                </a:rPr>
+                <a:t>transformados</a:t>
+              </a:r>
+              <a:endParaRPr lang="pt-BR" dirty="0">
+                <a:latin typeface="Arial" panose="020B0604020202020204" pitchFamily="34" charset="0"/>
+                <a:cs typeface="Arial" panose="020B0604020202020204" pitchFamily="34" charset="0"/>
+              </a:endParaRPr>
+            </a:p>
+          </p:txBody>
+        </p:sp>
+        <p:sp>
+          <p:nvSpPr>
+            <p:cNvPr id="34" name="CaixaDeTexto 33"/>
+            <p:cNvSpPr txBox="1"/>
+            <p:nvPr/>
+          </p:nvSpPr>
+          <p:spPr>
+            <a:xfrm>
+              <a:off x="5219930" y="2817180"/>
+              <a:ext cx="1318523" cy="190581"/>
+            </a:xfrm>
+            <a:prstGeom prst="rect">
+              <a:avLst/>
+            </a:prstGeom>
+            <a:noFill/>
+          </p:spPr>
+          <p:txBody>
+            <a:bodyPr wrap="square" rtlCol="0">
+              <a:spAutoFit/>
+            </a:bodyPr>
+            <a:lstStyle/>
+            <a:p>
+              <a:pPr algn="ctr"/>
+              <a:r>
+                <a:rPr lang="pt-BR" dirty="0">
+                  <a:latin typeface="Arial" panose="020B0604020202020204" pitchFamily="34" charset="0"/>
+                  <a:cs typeface="Arial" panose="020B0604020202020204" pitchFamily="34" charset="0"/>
+                </a:rPr>
+                <a:t>P</a:t>
+              </a:r>
+              <a:r>
+                <a:rPr lang="pt-BR" dirty="0" smtClean="0">
+                  <a:latin typeface="Arial" panose="020B0604020202020204" pitchFamily="34" charset="0"/>
+                  <a:cs typeface="Arial" panose="020B0604020202020204" pitchFamily="34" charset="0"/>
+                </a:rPr>
+                <a:t>adrões</a:t>
+              </a:r>
+              <a:endParaRPr lang="pt-BR" dirty="0">
+                <a:latin typeface="Arial" panose="020B0604020202020204" pitchFamily="34" charset="0"/>
+                <a:cs typeface="Arial" panose="020B0604020202020204" pitchFamily="34" charset="0"/>
+              </a:endParaRPr>
+            </a:p>
+          </p:txBody>
+        </p:sp>
+        <p:sp>
+          <p:nvSpPr>
+            <p:cNvPr id="35" name="CaixaDeTexto 34"/>
+            <p:cNvSpPr txBox="1"/>
+            <p:nvPr/>
+          </p:nvSpPr>
+          <p:spPr>
+            <a:xfrm>
+              <a:off x="6539770" y="2469523"/>
+              <a:ext cx="1318523" cy="190581"/>
+            </a:xfrm>
+            <a:prstGeom prst="rect">
+              <a:avLst/>
+            </a:prstGeom>
+            <a:noFill/>
+          </p:spPr>
+          <p:txBody>
+            <a:bodyPr wrap="square" rtlCol="0">
+              <a:spAutoFit/>
+            </a:bodyPr>
+            <a:lstStyle/>
+            <a:p>
+              <a:pPr algn="ctr"/>
+              <a:r>
+                <a:rPr lang="pt-BR" dirty="0" smtClean="0">
+                  <a:latin typeface="Arial" panose="020B0604020202020204" pitchFamily="34" charset="0"/>
+                  <a:cs typeface="Arial" panose="020B0604020202020204" pitchFamily="34" charset="0"/>
+                </a:rPr>
+                <a:t>Conhecimento</a:t>
+              </a:r>
+              <a:endParaRPr lang="pt-BR" dirty="0">
+                <a:latin typeface="Arial" panose="020B0604020202020204" pitchFamily="34" charset="0"/>
+                <a:cs typeface="Arial" panose="020B0604020202020204" pitchFamily="34" charset="0"/>
+              </a:endParaRPr>
+            </a:p>
+          </p:txBody>
+        </p:sp>
+        <p:grpSp>
+          <p:nvGrpSpPr>
+            <p:cNvPr id="36" name="Agrupar 35"/>
+            <p:cNvGrpSpPr/>
+            <p:nvPr/>
+          </p:nvGrpSpPr>
+          <p:grpSpPr>
+            <a:xfrm>
+              <a:off x="5602208" y="2357533"/>
+              <a:ext cx="654572" cy="437249"/>
+              <a:chOff x="5665805" y="2321942"/>
+              <a:chExt cx="654572" cy="437249"/>
+            </a:xfrm>
+          </p:grpSpPr>
+          <p:grpSp>
+            <p:nvGrpSpPr>
+              <p:cNvPr id="37" name="Agrupar 36"/>
+              <p:cNvGrpSpPr/>
+              <p:nvPr/>
+            </p:nvGrpSpPr>
+            <p:grpSpPr>
+              <a:xfrm>
+                <a:off x="5734589" y="2361685"/>
+                <a:ext cx="585788" cy="350052"/>
+                <a:chOff x="5815549" y="2356923"/>
+                <a:chExt cx="585788" cy="350052"/>
+              </a:xfrm>
+            </p:grpSpPr>
+            <p:cxnSp>
+              <p:nvCxnSpPr>
+                <p:cNvPr id="45" name="Conector reto 44"/>
+                <p:cNvCxnSpPr/>
+                <p:nvPr/>
+              </p:nvCxnSpPr>
+              <p:spPr>
+                <a:xfrm>
+                  <a:off x="5815549" y="2706975"/>
+                  <a:ext cx="581025" cy="0"/>
+                </a:xfrm>
+                <a:prstGeom prst="line">
+                  <a:avLst/>
+                </a:prstGeom>
+                <a:ln w="28575"/>
+              </p:spPr>
+              <p:style>
+                <a:lnRef idx="1">
+                  <a:schemeClr val="accent1"/>
+                </a:lnRef>
+                <a:fillRef idx="0">
+                  <a:schemeClr val="accent1"/>
+                </a:fillRef>
+                <a:effectRef idx="0">
+                  <a:schemeClr val="accent1"/>
+                </a:effectRef>
+                <a:fontRef idx="minor">
+                  <a:schemeClr val="tx1"/>
+                </a:fontRef>
+              </p:style>
+            </p:cxnSp>
+            <p:grpSp>
+              <p:nvGrpSpPr>
+                <p:cNvPr id="46" name="Agrupar 45"/>
+                <p:cNvGrpSpPr/>
+                <p:nvPr/>
+              </p:nvGrpSpPr>
+              <p:grpSpPr>
+                <a:xfrm>
+                  <a:off x="5815549" y="2356923"/>
+                  <a:ext cx="581025" cy="310032"/>
+                  <a:chOff x="6134100" y="2504606"/>
+                  <a:chExt cx="581025" cy="310032"/>
+                </a:xfrm>
+              </p:grpSpPr>
+              <p:cxnSp>
+                <p:nvCxnSpPr>
+                  <p:cNvPr id="58" name="Conector reto 57"/>
+                  <p:cNvCxnSpPr/>
+                  <p:nvPr/>
+                </p:nvCxnSpPr>
+                <p:spPr>
+                  <a:xfrm flipV="1">
+                    <a:off x="6134100" y="2628900"/>
+                    <a:ext cx="169069" cy="185738"/>
+                  </a:xfrm>
+                  <a:prstGeom prst="line">
+                    <a:avLst/>
+                  </a:prstGeom>
+                </p:spPr>
+                <p:style>
+                  <a:lnRef idx="1">
+                    <a:schemeClr val="accent4"/>
+                  </a:lnRef>
+                  <a:fillRef idx="0">
+                    <a:schemeClr val="accent4"/>
+                  </a:fillRef>
+                  <a:effectRef idx="0">
+                    <a:schemeClr val="accent4"/>
+                  </a:effectRef>
+                  <a:fontRef idx="minor">
+                    <a:schemeClr val="tx1"/>
+                  </a:fontRef>
+                </p:style>
+              </p:cxnSp>
+              <p:cxnSp>
+                <p:nvCxnSpPr>
+                  <p:cNvPr id="59" name="Conector reto 58"/>
+                  <p:cNvCxnSpPr/>
+                  <p:nvPr/>
+                </p:nvCxnSpPr>
+                <p:spPr>
+                  <a:xfrm>
+                    <a:off x="6303169" y="2626519"/>
+                    <a:ext cx="209550" cy="94891"/>
+                  </a:xfrm>
+                  <a:prstGeom prst="line">
+                    <a:avLst/>
+                  </a:prstGeom>
+                </p:spPr>
+                <p:style>
+                  <a:lnRef idx="1">
+                    <a:schemeClr val="accent4"/>
+                  </a:lnRef>
+                  <a:fillRef idx="0">
+                    <a:schemeClr val="accent4"/>
+                  </a:fillRef>
+                  <a:effectRef idx="0">
+                    <a:schemeClr val="accent4"/>
+                  </a:effectRef>
+                  <a:fontRef idx="minor">
+                    <a:schemeClr val="tx1"/>
+                  </a:fontRef>
+                </p:style>
+              </p:cxnSp>
+              <p:cxnSp>
+                <p:nvCxnSpPr>
+                  <p:cNvPr id="60" name="Conector reto 59"/>
+                  <p:cNvCxnSpPr/>
+                  <p:nvPr/>
+                </p:nvCxnSpPr>
+                <p:spPr>
+                  <a:xfrm flipV="1">
+                    <a:off x="6512719" y="2504606"/>
+                    <a:ext cx="202406" cy="216804"/>
+                  </a:xfrm>
+                  <a:prstGeom prst="line">
+                    <a:avLst/>
+                  </a:prstGeom>
+                </p:spPr>
+                <p:style>
+                  <a:lnRef idx="1">
+                    <a:schemeClr val="accent4"/>
+                  </a:lnRef>
+                  <a:fillRef idx="0">
+                    <a:schemeClr val="accent4"/>
+                  </a:fillRef>
+                  <a:effectRef idx="0">
+                    <a:schemeClr val="accent4"/>
+                  </a:effectRef>
+                  <a:fontRef idx="minor">
+                    <a:schemeClr val="tx1"/>
+                  </a:fontRef>
+                </p:style>
+              </p:cxnSp>
+            </p:grpSp>
+            <p:grpSp>
+              <p:nvGrpSpPr>
+                <p:cNvPr id="47" name="Agrupar 46"/>
+                <p:cNvGrpSpPr/>
+                <p:nvPr/>
+              </p:nvGrpSpPr>
+              <p:grpSpPr>
+                <a:xfrm>
+                  <a:off x="5825074" y="2478836"/>
+                  <a:ext cx="571500" cy="169730"/>
+                  <a:chOff x="6143625" y="2626519"/>
+                  <a:chExt cx="571500" cy="169730"/>
+                </a:xfrm>
+              </p:grpSpPr>
+              <p:cxnSp>
+                <p:nvCxnSpPr>
+                  <p:cNvPr id="53" name="Conector reto 52"/>
+                  <p:cNvCxnSpPr/>
+                  <p:nvPr/>
+                </p:nvCxnSpPr>
+                <p:spPr>
+                  <a:xfrm flipH="1">
+                    <a:off x="6367463" y="2646571"/>
+                    <a:ext cx="50006" cy="74839"/>
+                  </a:xfrm>
+                  <a:prstGeom prst="line">
+                    <a:avLst/>
+                  </a:prstGeom>
+                </p:spPr>
+                <p:style>
+                  <a:lnRef idx="1">
+                    <a:schemeClr val="accent5"/>
+                  </a:lnRef>
+                  <a:fillRef idx="0">
+                    <a:schemeClr val="accent5"/>
+                  </a:fillRef>
+                  <a:effectRef idx="0">
+                    <a:schemeClr val="accent5"/>
+                  </a:effectRef>
+                  <a:fontRef idx="minor">
+                    <a:schemeClr val="tx1"/>
+                  </a:fontRef>
+                </p:style>
+              </p:cxnSp>
+              <p:grpSp>
+                <p:nvGrpSpPr>
+                  <p:cNvPr id="54" name="Agrupar 53"/>
+                  <p:cNvGrpSpPr/>
+                  <p:nvPr/>
+                </p:nvGrpSpPr>
+                <p:grpSpPr>
+                  <a:xfrm>
+                    <a:off x="6143625" y="2626519"/>
+                    <a:ext cx="571500" cy="169730"/>
+                    <a:chOff x="6143625" y="2626519"/>
+                    <a:chExt cx="571500" cy="169730"/>
+                  </a:xfrm>
+                </p:grpSpPr>
+                <p:cxnSp>
+                  <p:nvCxnSpPr>
+                    <p:cNvPr id="55" name="Conector reto 54"/>
+                    <p:cNvCxnSpPr/>
+                    <p:nvPr/>
+                  </p:nvCxnSpPr>
+                  <p:spPr>
+                    <a:xfrm flipH="1">
+                      <a:off x="6488906" y="2759869"/>
+                      <a:ext cx="226219" cy="36380"/>
+                    </a:xfrm>
+                    <a:prstGeom prst="line">
+                      <a:avLst/>
+                    </a:prstGeom>
+                  </p:spPr>
+                  <p:style>
+                    <a:lnRef idx="1">
+                      <a:schemeClr val="accent5"/>
+                    </a:lnRef>
+                    <a:fillRef idx="0">
+                      <a:schemeClr val="accent5"/>
+                    </a:fillRef>
+                    <a:effectRef idx="0">
+                      <a:schemeClr val="accent5"/>
+                    </a:effectRef>
+                    <a:fontRef idx="minor">
+                      <a:schemeClr val="tx1"/>
+                    </a:fontRef>
+                  </p:style>
+                </p:cxnSp>
+                <p:cxnSp>
+                  <p:nvCxnSpPr>
+                    <p:cNvPr id="56" name="Conector reto 55"/>
+                    <p:cNvCxnSpPr/>
+                    <p:nvPr/>
+                  </p:nvCxnSpPr>
+                  <p:spPr>
+                    <a:xfrm flipH="1" flipV="1">
+                      <a:off x="6415088" y="2646571"/>
+                      <a:ext cx="73818" cy="149678"/>
+                    </a:xfrm>
+                    <a:prstGeom prst="line">
+                      <a:avLst/>
+                    </a:prstGeom>
+                  </p:spPr>
+                  <p:style>
+                    <a:lnRef idx="1">
+                      <a:schemeClr val="accent5"/>
+                    </a:lnRef>
+                    <a:fillRef idx="0">
+                      <a:schemeClr val="accent5"/>
+                    </a:fillRef>
+                    <a:effectRef idx="0">
+                      <a:schemeClr val="accent5"/>
+                    </a:effectRef>
+                    <a:fontRef idx="minor">
+                      <a:schemeClr val="tx1"/>
+                    </a:fontRef>
+                  </p:style>
+                </p:cxnSp>
+                <p:cxnSp>
+                  <p:nvCxnSpPr>
+                    <p:cNvPr id="57" name="Conector reto 56"/>
+                    <p:cNvCxnSpPr/>
+                    <p:nvPr/>
+                  </p:nvCxnSpPr>
+                  <p:spPr>
+                    <a:xfrm flipH="1" flipV="1">
+                      <a:off x="6143625" y="2626519"/>
+                      <a:ext cx="223838" cy="94892"/>
+                    </a:xfrm>
+                    <a:prstGeom prst="line">
+                      <a:avLst/>
+                    </a:prstGeom>
+                  </p:spPr>
+                  <p:style>
+                    <a:lnRef idx="1">
+                      <a:schemeClr val="accent5"/>
+                    </a:lnRef>
+                    <a:fillRef idx="0">
+                      <a:schemeClr val="accent5"/>
+                    </a:fillRef>
+                    <a:effectRef idx="0">
+                      <a:schemeClr val="accent5"/>
+                    </a:effectRef>
+                    <a:fontRef idx="minor">
+                      <a:schemeClr val="tx1"/>
+                    </a:fontRef>
+                  </p:style>
+                </p:cxnSp>
+              </p:grpSp>
+            </p:grpSp>
+            <p:cxnSp>
+              <p:nvCxnSpPr>
+                <p:cNvPr id="48" name="Conector reto 47"/>
+                <p:cNvCxnSpPr/>
+                <p:nvPr/>
+              </p:nvCxnSpPr>
+              <p:spPr>
+                <a:xfrm>
+                  <a:off x="5815549" y="2634172"/>
+                  <a:ext cx="581025" cy="0"/>
+                </a:xfrm>
+                <a:prstGeom prst="line">
+                  <a:avLst/>
+                </a:prstGeom>
+                <a:ln w="3175">
+                  <a:prstDash val="dash"/>
+                </a:ln>
+              </p:spPr>
+              <p:style>
+                <a:lnRef idx="1">
+                  <a:schemeClr val="dk1"/>
+                </a:lnRef>
+                <a:fillRef idx="0">
+                  <a:schemeClr val="dk1"/>
+                </a:fillRef>
+                <a:effectRef idx="0">
+                  <a:schemeClr val="dk1"/>
+                </a:effectRef>
+                <a:fontRef idx="minor">
+                  <a:schemeClr val="tx1"/>
+                </a:fontRef>
+              </p:style>
+            </p:cxnSp>
+            <p:cxnSp>
+              <p:nvCxnSpPr>
+                <p:cNvPr id="49" name="Conector reto 48"/>
+                <p:cNvCxnSpPr/>
+                <p:nvPr/>
+              </p:nvCxnSpPr>
+              <p:spPr>
+                <a:xfrm>
+                  <a:off x="5815549" y="2573727"/>
+                  <a:ext cx="581025" cy="0"/>
+                </a:xfrm>
+                <a:prstGeom prst="line">
+                  <a:avLst/>
+                </a:prstGeom>
+                <a:ln w="3175">
+                  <a:prstDash val="dash"/>
+                </a:ln>
+              </p:spPr>
+              <p:style>
+                <a:lnRef idx="1">
+                  <a:schemeClr val="dk1"/>
+                </a:lnRef>
+                <a:fillRef idx="0">
+                  <a:schemeClr val="dk1"/>
+                </a:fillRef>
+                <a:effectRef idx="0">
+                  <a:schemeClr val="dk1"/>
+                </a:effectRef>
+                <a:fontRef idx="minor">
+                  <a:schemeClr val="tx1"/>
+                </a:fontRef>
+              </p:style>
+            </p:cxnSp>
+            <p:cxnSp>
+              <p:nvCxnSpPr>
+                <p:cNvPr id="50" name="Conector reto 49"/>
+                <p:cNvCxnSpPr/>
+                <p:nvPr/>
+              </p:nvCxnSpPr>
+              <p:spPr>
+                <a:xfrm>
+                  <a:off x="5817930" y="2511363"/>
+                  <a:ext cx="581025" cy="0"/>
+                </a:xfrm>
+                <a:prstGeom prst="line">
+                  <a:avLst/>
+                </a:prstGeom>
+                <a:ln w="3175">
+                  <a:prstDash val="dash"/>
+                </a:ln>
+              </p:spPr>
+              <p:style>
+                <a:lnRef idx="1">
+                  <a:schemeClr val="dk1"/>
+                </a:lnRef>
+                <a:fillRef idx="0">
+                  <a:schemeClr val="dk1"/>
+                </a:fillRef>
+                <a:effectRef idx="0">
+                  <a:schemeClr val="dk1"/>
+                </a:effectRef>
+                <a:fontRef idx="minor">
+                  <a:schemeClr val="tx1"/>
+                </a:fontRef>
+              </p:style>
+            </p:cxnSp>
+            <p:cxnSp>
+              <p:nvCxnSpPr>
+                <p:cNvPr id="51" name="Conector reto 50"/>
+                <p:cNvCxnSpPr/>
+                <p:nvPr/>
+              </p:nvCxnSpPr>
+              <p:spPr>
+                <a:xfrm>
+                  <a:off x="5817930" y="2450261"/>
+                  <a:ext cx="581025" cy="0"/>
+                </a:xfrm>
+                <a:prstGeom prst="line">
+                  <a:avLst/>
+                </a:prstGeom>
+                <a:ln w="3175">
+                  <a:prstDash val="dash"/>
+                </a:ln>
+              </p:spPr>
+              <p:style>
+                <a:lnRef idx="1">
+                  <a:schemeClr val="dk1"/>
+                </a:lnRef>
+                <a:fillRef idx="0">
+                  <a:schemeClr val="dk1"/>
+                </a:fillRef>
+                <a:effectRef idx="0">
+                  <a:schemeClr val="dk1"/>
+                </a:effectRef>
+                <a:fontRef idx="minor">
+                  <a:schemeClr val="tx1"/>
+                </a:fontRef>
+              </p:style>
+            </p:cxnSp>
+            <p:cxnSp>
+              <p:nvCxnSpPr>
+                <p:cNvPr id="52" name="Conector reto 51"/>
+                <p:cNvCxnSpPr/>
+                <p:nvPr/>
+              </p:nvCxnSpPr>
+              <p:spPr>
+                <a:xfrm>
+                  <a:off x="5820312" y="2386523"/>
+                  <a:ext cx="581025" cy="0"/>
+                </a:xfrm>
+                <a:prstGeom prst="line">
+                  <a:avLst/>
+                </a:prstGeom>
+                <a:ln w="3175">
+                  <a:prstDash val="dash"/>
+                </a:ln>
+              </p:spPr>
+              <p:style>
+                <a:lnRef idx="1">
+                  <a:schemeClr val="dk1"/>
+                </a:lnRef>
+                <a:fillRef idx="0">
+                  <a:schemeClr val="dk1"/>
+                </a:fillRef>
+                <a:effectRef idx="0">
+                  <a:schemeClr val="dk1"/>
+                </a:effectRef>
+                <a:fontRef idx="minor">
+                  <a:schemeClr val="tx1"/>
+                </a:fontRef>
+              </p:style>
+            </p:cxnSp>
+          </p:grpSp>
+          <p:grpSp>
+            <p:nvGrpSpPr>
+              <p:cNvPr id="38" name="Agrupar 37"/>
+              <p:cNvGrpSpPr/>
+              <p:nvPr/>
+            </p:nvGrpSpPr>
+            <p:grpSpPr>
+              <a:xfrm>
+                <a:off x="5665805" y="2321942"/>
+                <a:ext cx="297958" cy="437249"/>
+                <a:chOff x="5820966" y="2417409"/>
+                <a:chExt cx="342900" cy="514124"/>
+              </a:xfrm>
+            </p:grpSpPr>
+            <p:sp>
+              <p:nvSpPr>
+                <p:cNvPr id="39" name="Cilindro 38"/>
+                <p:cNvSpPr/>
+                <p:nvPr/>
+              </p:nvSpPr>
+              <p:spPr>
+                <a:xfrm>
+                  <a:off x="5820966" y="2781855"/>
+                  <a:ext cx="342900" cy="149678"/>
+                </a:xfrm>
+                <a:prstGeom prst="can">
+                  <a:avLst>
+                    <a:gd name="adj" fmla="val 50000"/>
+                  </a:avLst>
+                </a:prstGeom>
+              </p:spPr>
+              <p:style>
+                <a:lnRef idx="2">
+                  <a:schemeClr val="accent1">
+                    <a:shade val="50000"/>
+                  </a:schemeClr>
+                </a:lnRef>
+                <a:fillRef idx="1">
+                  <a:schemeClr val="accent1"/>
+                </a:fillRef>
+                <a:effectRef idx="0">
+                  <a:schemeClr val="accent1"/>
+                </a:effectRef>
+                <a:fontRef idx="minor">
+                  <a:schemeClr val="lt1"/>
+                </a:fontRef>
+              </p:style>
+              <p:txBody>
+                <a:bodyPr rtlCol="0" anchor="ctr"/>
+                <a:lstStyle/>
+                <a:p>
+                  <a:pPr algn="ctr"/>
+                  <a:endParaRPr lang="pt-BR">
+                    <a:latin typeface="Arial" panose="020B0604020202020204" pitchFamily="34" charset="0"/>
+                    <a:cs typeface="Arial" panose="020B0604020202020204" pitchFamily="34" charset="0"/>
+                  </a:endParaRPr>
+                </a:p>
+              </p:txBody>
+            </p:sp>
+            <p:sp>
+              <p:nvSpPr>
+                <p:cNvPr id="40" name="Cilindro 39"/>
+                <p:cNvSpPr/>
+                <p:nvPr/>
+              </p:nvSpPr>
+              <p:spPr>
+                <a:xfrm>
+                  <a:off x="5820966" y="2707016"/>
+                  <a:ext cx="342900" cy="149678"/>
+                </a:xfrm>
+                <a:prstGeom prst="can">
+                  <a:avLst>
+                    <a:gd name="adj" fmla="val 50000"/>
+                  </a:avLst>
+                </a:prstGeom>
+              </p:spPr>
+              <p:style>
+                <a:lnRef idx="2">
+                  <a:schemeClr val="accent1">
+                    <a:shade val="50000"/>
+                  </a:schemeClr>
+                </a:lnRef>
+                <a:fillRef idx="1">
+                  <a:schemeClr val="accent1"/>
+                </a:fillRef>
+                <a:effectRef idx="0">
+                  <a:schemeClr val="accent1"/>
+                </a:effectRef>
+                <a:fontRef idx="minor">
+                  <a:schemeClr val="lt1"/>
+                </a:fontRef>
+              </p:style>
+              <p:txBody>
+                <a:bodyPr rtlCol="0" anchor="ctr"/>
+                <a:lstStyle/>
+                <a:p>
+                  <a:pPr algn="ctr"/>
+                  <a:endParaRPr lang="pt-BR">
+                    <a:latin typeface="Arial" panose="020B0604020202020204" pitchFamily="34" charset="0"/>
+                    <a:cs typeface="Arial" panose="020B0604020202020204" pitchFamily="34" charset="0"/>
+                  </a:endParaRPr>
+                </a:p>
+              </p:txBody>
+            </p:sp>
+            <p:sp>
+              <p:nvSpPr>
+                <p:cNvPr id="41" name="Cilindro 40"/>
+                <p:cNvSpPr/>
+                <p:nvPr/>
+              </p:nvSpPr>
+              <p:spPr>
+                <a:xfrm>
+                  <a:off x="5820966" y="2632177"/>
+                  <a:ext cx="342900" cy="149678"/>
+                </a:xfrm>
+                <a:prstGeom prst="can">
+                  <a:avLst>
+                    <a:gd name="adj" fmla="val 50000"/>
+                  </a:avLst>
+                </a:prstGeom>
+              </p:spPr>
+              <p:style>
+                <a:lnRef idx="2">
+                  <a:schemeClr val="accent1">
+                    <a:shade val="50000"/>
+                  </a:schemeClr>
+                </a:lnRef>
+                <a:fillRef idx="1">
+                  <a:schemeClr val="accent1"/>
+                </a:fillRef>
+                <a:effectRef idx="0">
+                  <a:schemeClr val="accent1"/>
+                </a:effectRef>
+                <a:fontRef idx="minor">
+                  <a:schemeClr val="lt1"/>
+                </a:fontRef>
+              </p:style>
+              <p:txBody>
+                <a:bodyPr rtlCol="0" anchor="ctr"/>
+                <a:lstStyle/>
+                <a:p>
+                  <a:pPr algn="ctr"/>
+                  <a:endParaRPr lang="pt-BR">
+                    <a:latin typeface="Arial" panose="020B0604020202020204" pitchFamily="34" charset="0"/>
+                    <a:cs typeface="Arial" panose="020B0604020202020204" pitchFamily="34" charset="0"/>
+                  </a:endParaRPr>
+                </a:p>
+              </p:txBody>
+            </p:sp>
+            <p:sp>
+              <p:nvSpPr>
+                <p:cNvPr id="42" name="Cilindro 41"/>
+                <p:cNvSpPr/>
+                <p:nvPr/>
+              </p:nvSpPr>
+              <p:spPr>
+                <a:xfrm>
+                  <a:off x="5820966" y="2565051"/>
+                  <a:ext cx="342900" cy="149678"/>
+                </a:xfrm>
+                <a:prstGeom prst="can">
+                  <a:avLst>
+                    <a:gd name="adj" fmla="val 50000"/>
+                  </a:avLst>
+                </a:prstGeom>
+              </p:spPr>
+              <p:style>
+                <a:lnRef idx="2">
+                  <a:schemeClr val="accent1">
+                    <a:shade val="50000"/>
+                  </a:schemeClr>
+                </a:lnRef>
+                <a:fillRef idx="1">
+                  <a:schemeClr val="accent1"/>
+                </a:fillRef>
+                <a:effectRef idx="0">
+                  <a:schemeClr val="accent1"/>
+                </a:effectRef>
+                <a:fontRef idx="minor">
+                  <a:schemeClr val="lt1"/>
+                </a:fontRef>
+              </p:style>
+              <p:txBody>
+                <a:bodyPr rtlCol="0" anchor="ctr"/>
+                <a:lstStyle/>
+                <a:p>
+                  <a:pPr algn="ctr"/>
+                  <a:endParaRPr lang="pt-BR">
+                    <a:latin typeface="Arial" panose="020B0604020202020204" pitchFamily="34" charset="0"/>
+                    <a:cs typeface="Arial" panose="020B0604020202020204" pitchFamily="34" charset="0"/>
+                  </a:endParaRPr>
+                </a:p>
+              </p:txBody>
+            </p:sp>
+            <p:sp>
+              <p:nvSpPr>
+                <p:cNvPr id="43" name="Cilindro 42"/>
+                <p:cNvSpPr/>
+                <p:nvPr/>
+              </p:nvSpPr>
+              <p:spPr>
+                <a:xfrm>
+                  <a:off x="5820966" y="2490212"/>
+                  <a:ext cx="342900" cy="149678"/>
+                </a:xfrm>
+                <a:prstGeom prst="can">
+                  <a:avLst>
+                    <a:gd name="adj" fmla="val 50000"/>
+                  </a:avLst>
+                </a:prstGeom>
+              </p:spPr>
+              <p:style>
+                <a:lnRef idx="2">
+                  <a:schemeClr val="accent1">
+                    <a:shade val="50000"/>
+                  </a:schemeClr>
+                </a:lnRef>
+                <a:fillRef idx="1">
+                  <a:schemeClr val="accent1"/>
+                </a:fillRef>
+                <a:effectRef idx="0">
+                  <a:schemeClr val="accent1"/>
+                </a:effectRef>
+                <a:fontRef idx="minor">
+                  <a:schemeClr val="lt1"/>
+                </a:fontRef>
+              </p:style>
+              <p:txBody>
+                <a:bodyPr rtlCol="0" anchor="ctr"/>
+                <a:lstStyle/>
+                <a:p>
+                  <a:pPr algn="ctr"/>
+                  <a:endParaRPr lang="pt-BR">
+                    <a:latin typeface="Arial" panose="020B0604020202020204" pitchFamily="34" charset="0"/>
+                    <a:cs typeface="Arial" panose="020B0604020202020204" pitchFamily="34" charset="0"/>
+                  </a:endParaRPr>
+                </a:p>
+              </p:txBody>
+            </p:sp>
+            <p:sp>
+              <p:nvSpPr>
+                <p:cNvPr id="44" name="Cilindro 43"/>
+                <p:cNvSpPr/>
+                <p:nvPr/>
+              </p:nvSpPr>
+              <p:spPr>
+                <a:xfrm>
+                  <a:off x="5820966" y="2417409"/>
+                  <a:ext cx="342900" cy="149678"/>
+                </a:xfrm>
+                <a:prstGeom prst="can">
+                  <a:avLst>
+                    <a:gd name="adj" fmla="val 50000"/>
+                  </a:avLst>
+                </a:prstGeom>
+              </p:spPr>
+              <p:style>
+                <a:lnRef idx="2">
+                  <a:schemeClr val="accent1">
+                    <a:shade val="50000"/>
+                  </a:schemeClr>
+                </a:lnRef>
+                <a:fillRef idx="1">
+                  <a:schemeClr val="accent1"/>
+                </a:fillRef>
+                <a:effectRef idx="0">
+                  <a:schemeClr val="accent1"/>
+                </a:effectRef>
+                <a:fontRef idx="minor">
+                  <a:schemeClr val="lt1"/>
+                </a:fontRef>
+              </p:style>
+              <p:txBody>
+                <a:bodyPr rtlCol="0" anchor="ctr"/>
+                <a:lstStyle/>
+                <a:p>
+                  <a:pPr algn="ctr"/>
+                  <a:endParaRPr lang="pt-BR">
+                    <a:latin typeface="Arial" panose="020B0604020202020204" pitchFamily="34" charset="0"/>
+                    <a:cs typeface="Arial" panose="020B0604020202020204" pitchFamily="34" charset="0"/>
+                  </a:endParaRPr>
+                </a:p>
+              </p:txBody>
+            </p:sp>
+          </p:grpSp>
+        </p:grpSp>
+      </p:grpSp>
+    </p:spTree>
+    <p:extLst>
+      <p:ext uri="{BB962C8B-B14F-4D97-AF65-F5344CB8AC3E}">
+        <p14:creationId xmlns:p14="http://schemas.microsoft.com/office/powerpoint/2010/main" val="1420964291"/>
       </p:ext>
     </p:extLst>
   </p:cSld>

</xml_diff>